<commit_message>
chore: update presentation file with latest changes
</commit_message>
<xml_diff>
--- a/CtrlAltDefekt - Kvízjáték.pptx
+++ b/CtrlAltDefekt - Kvízjáték.pptx
@@ -5,21 +5,26 @@
     <p:sldMasterId id="2147483678" r:id="rId1"/>
   </p:sldMasterIdLst>
   <p:notesMasterIdLst>
-    <p:notesMasterId r:id="rId14"/>
+    <p:notesMasterId r:id="rId19"/>
   </p:notesMasterIdLst>
   <p:sldIdLst>
     <p:sldId id="256" r:id="rId2"/>
-    <p:sldId id="257" r:id="rId3"/>
-    <p:sldId id="260" r:id="rId4"/>
-    <p:sldId id="259" r:id="rId5"/>
-    <p:sldId id="261" r:id="rId6"/>
-    <p:sldId id="262" r:id="rId7"/>
-    <p:sldId id="263" r:id="rId8"/>
-    <p:sldId id="264" r:id="rId9"/>
-    <p:sldId id="265" r:id="rId10"/>
-    <p:sldId id="266" r:id="rId11"/>
-    <p:sldId id="267" r:id="rId12"/>
-    <p:sldId id="258" r:id="rId13"/>
+    <p:sldId id="268" r:id="rId3"/>
+    <p:sldId id="269" r:id="rId4"/>
+    <p:sldId id="270" r:id="rId5"/>
+    <p:sldId id="271" r:id="rId6"/>
+    <p:sldId id="272" r:id="rId7"/>
+    <p:sldId id="257" r:id="rId8"/>
+    <p:sldId id="260" r:id="rId9"/>
+    <p:sldId id="259" r:id="rId10"/>
+    <p:sldId id="261" r:id="rId11"/>
+    <p:sldId id="262" r:id="rId12"/>
+    <p:sldId id="263" r:id="rId13"/>
+    <p:sldId id="264" r:id="rId14"/>
+    <p:sldId id="265" r:id="rId15"/>
+    <p:sldId id="266" r:id="rId16"/>
+    <p:sldId id="267" r:id="rId17"/>
+    <p:sldId id="258" r:id="rId18"/>
   </p:sldIdLst>
   <p:sldSz cx="12192000" cy="6858000"/>
   <p:notesSz cx="6858000" cy="9144000"/>
@@ -118,6 +123,11 @@
       </a:defRPr>
     </a:lvl9pPr>
   </p:defaultTextStyle>
+  <p:extLst>
+    <p:ext uri="{EFAFB233-063F-42B5-8137-9DF3F51BA10A}">
+      <p15:sldGuideLst xmlns:p15="http://schemas.microsoft.com/office/powerpoint/2012/main"/>
+    </p:ext>
+  </p:extLst>
 </p:presentation>
 </file>
 
@@ -203,7 +213,7 @@
           <a:p>
             <a:fld id="{0155E23B-0C02-45C8-90A8-1DD4A0703ACF}" type="datetimeFigureOut">
               <a:rPr lang="hu-HU" smtClean="0"/>
-              <a:t>2025. 11. 17.</a:t>
+              <a:t>2025. 12. 07.</a:t>
             </a:fld>
             <a:endParaRPr lang="hu-HU"/>
           </a:p>
@@ -535,7 +545,307 @@
           <a:p>
             <a:fld id="{1CB59CB9-3FBD-4C6A-B95F-626319C0553F}" type="slidenum">
               <a:rPr lang="hu-HU" smtClean="0"/>
-              <a:t>6</a:t>
+              <a:t>2</a:t>
+            </a:fld>
+            <a:endParaRPr lang="hu-HU"/>
+          </a:p>
+        </p:txBody>
+      </p:sp>
+    </p:spTree>
+    <p:extLst>
+      <p:ext uri="{BB962C8B-B14F-4D97-AF65-F5344CB8AC3E}">
+        <p14:creationId xmlns:p14="http://schemas.microsoft.com/office/powerpoint/2010/main" val="892531811"/>
+      </p:ext>
+    </p:extLst>
+  </p:cSld>
+  <p:clrMapOvr>
+    <a:masterClrMapping/>
+  </p:clrMapOvr>
+</p:notes>
+</file>
+
+<file path=ppt/notesSlides/notesSlide2.xml><?xml version="1.0" encoding="utf-8"?>
+<p:notes xmlns:a="http://schemas.openxmlformats.org/drawingml/2006/main" xmlns:r="http://schemas.openxmlformats.org/officeDocument/2006/relationships" xmlns:p="http://schemas.openxmlformats.org/presentationml/2006/main">
+  <p:cSld>
+    <p:spTree>
+      <p:nvGrpSpPr>
+        <p:cNvPr id="1" name="">
+          <a:extLst>
+            <a:ext uri="{FF2B5EF4-FFF2-40B4-BE49-F238E27FC236}">
+              <a16:creationId xmlns:a16="http://schemas.microsoft.com/office/drawing/2014/main" id="{84E75039-8A84-FE59-409F-D6B44E498B9A}"/>
+            </a:ext>
+          </a:extLst>
+        </p:cNvPr>
+        <p:cNvGrpSpPr/>
+        <p:nvPr/>
+      </p:nvGrpSpPr>
+      <p:grpSpPr>
+        <a:xfrm>
+          <a:off x="0" y="0"/>
+          <a:ext cx="0" cy="0"/>
+          <a:chOff x="0" y="0"/>
+          <a:chExt cx="0" cy="0"/>
+        </a:xfrm>
+      </p:grpSpPr>
+      <p:sp>
+        <p:nvSpPr>
+          <p:cNvPr id="2" name="Diakép helye 1">
+            <a:extLst>
+              <a:ext uri="{FF2B5EF4-FFF2-40B4-BE49-F238E27FC236}">
+                <a16:creationId xmlns:a16="http://schemas.microsoft.com/office/drawing/2014/main" id="{F193ADFD-7586-5358-AE2C-06B598348DBF}"/>
+              </a:ext>
+            </a:extLst>
+          </p:cNvPr>
+          <p:cNvSpPr>
+            <a:spLocks noGrp="1" noRot="1" noChangeAspect="1"/>
+          </p:cNvSpPr>
+          <p:nvPr>
+            <p:ph type="sldImg"/>
+          </p:nvPr>
+        </p:nvSpPr>
+        <p:spPr/>
+      </p:sp>
+      <p:sp>
+        <p:nvSpPr>
+          <p:cNvPr id="3" name="Jegyzetek helye 2">
+            <a:extLst>
+              <a:ext uri="{FF2B5EF4-FFF2-40B4-BE49-F238E27FC236}">
+                <a16:creationId xmlns:a16="http://schemas.microsoft.com/office/drawing/2014/main" id="{E662063D-86F2-719E-6C22-861DF9768C1D}"/>
+              </a:ext>
+            </a:extLst>
+          </p:cNvPr>
+          <p:cNvSpPr>
+            <a:spLocks noGrp="1"/>
+          </p:cNvSpPr>
+          <p:nvPr>
+            <p:ph type="body" idx="1"/>
+          </p:nvPr>
+        </p:nvSpPr>
+        <p:spPr/>
+        <p:txBody>
+          <a:bodyPr/>
+          <a:lstStyle/>
+          <a:p>
+            <a:endParaRPr lang="hu-HU" dirty="0"/>
+          </a:p>
+        </p:txBody>
+      </p:sp>
+      <p:sp>
+        <p:nvSpPr>
+          <p:cNvPr id="4" name="Dia számának helye 3">
+            <a:extLst>
+              <a:ext uri="{FF2B5EF4-FFF2-40B4-BE49-F238E27FC236}">
+                <a16:creationId xmlns:a16="http://schemas.microsoft.com/office/drawing/2014/main" id="{2B230BB9-DCE4-CC9F-348F-AD370D68CDD2}"/>
+              </a:ext>
+            </a:extLst>
+          </p:cNvPr>
+          <p:cNvSpPr>
+            <a:spLocks noGrp="1"/>
+          </p:cNvSpPr>
+          <p:nvPr>
+            <p:ph type="sldNum" sz="quarter" idx="5"/>
+          </p:nvPr>
+        </p:nvSpPr>
+        <p:spPr/>
+        <p:txBody>
+          <a:bodyPr/>
+          <a:lstStyle/>
+          <a:p>
+            <a:fld id="{1CB59CB9-3FBD-4C6A-B95F-626319C0553F}" type="slidenum">
+              <a:rPr lang="hu-HU" smtClean="0"/>
+              <a:t>3</a:t>
+            </a:fld>
+            <a:endParaRPr lang="hu-HU"/>
+          </a:p>
+        </p:txBody>
+      </p:sp>
+    </p:spTree>
+    <p:extLst>
+      <p:ext uri="{BB962C8B-B14F-4D97-AF65-F5344CB8AC3E}">
+        <p14:creationId xmlns:p14="http://schemas.microsoft.com/office/powerpoint/2010/main" val="4204584029"/>
+      </p:ext>
+    </p:extLst>
+  </p:cSld>
+  <p:clrMapOvr>
+    <a:masterClrMapping/>
+  </p:clrMapOvr>
+</p:notes>
+</file>
+
+<file path=ppt/notesSlides/notesSlide3.xml><?xml version="1.0" encoding="utf-8"?>
+<p:notes xmlns:a="http://schemas.openxmlformats.org/drawingml/2006/main" xmlns:r="http://schemas.openxmlformats.org/officeDocument/2006/relationships" xmlns:p="http://schemas.openxmlformats.org/presentationml/2006/main">
+  <p:cSld>
+    <p:spTree>
+      <p:nvGrpSpPr>
+        <p:cNvPr id="1" name="">
+          <a:extLst>
+            <a:ext uri="{FF2B5EF4-FFF2-40B4-BE49-F238E27FC236}">
+              <a16:creationId xmlns:a16="http://schemas.microsoft.com/office/drawing/2014/main" id="{9EAA8124-2A83-4648-AE38-0D8DFFEF85D0}"/>
+            </a:ext>
+          </a:extLst>
+        </p:cNvPr>
+        <p:cNvGrpSpPr/>
+        <p:nvPr/>
+      </p:nvGrpSpPr>
+      <p:grpSpPr>
+        <a:xfrm>
+          <a:off x="0" y="0"/>
+          <a:ext cx="0" cy="0"/>
+          <a:chOff x="0" y="0"/>
+          <a:chExt cx="0" cy="0"/>
+        </a:xfrm>
+      </p:grpSpPr>
+      <p:sp>
+        <p:nvSpPr>
+          <p:cNvPr id="2" name="Diakép helye 1">
+            <a:extLst>
+              <a:ext uri="{FF2B5EF4-FFF2-40B4-BE49-F238E27FC236}">
+                <a16:creationId xmlns:a16="http://schemas.microsoft.com/office/drawing/2014/main" id="{9DF5B68F-46B2-FD06-CE34-CEC877C3E493}"/>
+              </a:ext>
+            </a:extLst>
+          </p:cNvPr>
+          <p:cNvSpPr>
+            <a:spLocks noGrp="1" noRot="1" noChangeAspect="1"/>
+          </p:cNvSpPr>
+          <p:nvPr>
+            <p:ph type="sldImg"/>
+          </p:nvPr>
+        </p:nvSpPr>
+        <p:spPr/>
+      </p:sp>
+      <p:sp>
+        <p:nvSpPr>
+          <p:cNvPr id="3" name="Jegyzetek helye 2">
+            <a:extLst>
+              <a:ext uri="{FF2B5EF4-FFF2-40B4-BE49-F238E27FC236}">
+                <a16:creationId xmlns:a16="http://schemas.microsoft.com/office/drawing/2014/main" id="{CF9FFDFB-F64A-BDA2-C620-958A31A15F84}"/>
+              </a:ext>
+            </a:extLst>
+          </p:cNvPr>
+          <p:cNvSpPr>
+            <a:spLocks noGrp="1"/>
+          </p:cNvSpPr>
+          <p:nvPr>
+            <p:ph type="body" idx="1"/>
+          </p:nvPr>
+        </p:nvSpPr>
+        <p:spPr/>
+        <p:txBody>
+          <a:bodyPr/>
+          <a:lstStyle/>
+          <a:p>
+            <a:endParaRPr lang="hu-HU" dirty="0"/>
+          </a:p>
+        </p:txBody>
+      </p:sp>
+      <p:sp>
+        <p:nvSpPr>
+          <p:cNvPr id="4" name="Dia számának helye 3">
+            <a:extLst>
+              <a:ext uri="{FF2B5EF4-FFF2-40B4-BE49-F238E27FC236}">
+                <a16:creationId xmlns:a16="http://schemas.microsoft.com/office/drawing/2014/main" id="{617EDDFB-C347-E5FA-F2C9-891A2AA734AD}"/>
+              </a:ext>
+            </a:extLst>
+          </p:cNvPr>
+          <p:cNvSpPr>
+            <a:spLocks noGrp="1"/>
+          </p:cNvSpPr>
+          <p:nvPr>
+            <p:ph type="sldNum" sz="quarter" idx="5"/>
+          </p:nvPr>
+        </p:nvSpPr>
+        <p:spPr/>
+        <p:txBody>
+          <a:bodyPr/>
+          <a:lstStyle/>
+          <a:p>
+            <a:fld id="{1CB59CB9-3FBD-4C6A-B95F-626319C0553F}" type="slidenum">
+              <a:rPr lang="hu-HU" smtClean="0"/>
+              <a:t>4</a:t>
+            </a:fld>
+            <a:endParaRPr lang="hu-HU"/>
+          </a:p>
+        </p:txBody>
+      </p:sp>
+    </p:spTree>
+    <p:extLst>
+      <p:ext uri="{BB962C8B-B14F-4D97-AF65-F5344CB8AC3E}">
+        <p14:creationId xmlns:p14="http://schemas.microsoft.com/office/powerpoint/2010/main" val="3081700115"/>
+      </p:ext>
+    </p:extLst>
+  </p:cSld>
+  <p:clrMapOvr>
+    <a:masterClrMapping/>
+  </p:clrMapOvr>
+</p:notes>
+</file>
+
+<file path=ppt/notesSlides/notesSlide4.xml><?xml version="1.0" encoding="utf-8"?>
+<p:notes xmlns:a="http://schemas.openxmlformats.org/drawingml/2006/main" xmlns:r="http://schemas.openxmlformats.org/officeDocument/2006/relationships" xmlns:p="http://schemas.openxmlformats.org/presentationml/2006/main">
+  <p:cSld>
+    <p:spTree>
+      <p:nvGrpSpPr>
+        <p:cNvPr id="1" name=""/>
+        <p:cNvGrpSpPr/>
+        <p:nvPr/>
+      </p:nvGrpSpPr>
+      <p:grpSpPr>
+        <a:xfrm>
+          <a:off x="0" y="0"/>
+          <a:ext cx="0" cy="0"/>
+          <a:chOff x="0" y="0"/>
+          <a:chExt cx="0" cy="0"/>
+        </a:xfrm>
+      </p:grpSpPr>
+      <p:sp>
+        <p:nvSpPr>
+          <p:cNvPr id="2" name="Diakép helye 1"/>
+          <p:cNvSpPr>
+            <a:spLocks noGrp="1" noRot="1" noChangeAspect="1"/>
+          </p:cNvSpPr>
+          <p:nvPr>
+            <p:ph type="sldImg"/>
+          </p:nvPr>
+        </p:nvSpPr>
+        <p:spPr/>
+      </p:sp>
+      <p:sp>
+        <p:nvSpPr>
+          <p:cNvPr id="3" name="Jegyzetek helye 2"/>
+          <p:cNvSpPr>
+            <a:spLocks noGrp="1"/>
+          </p:cNvSpPr>
+          <p:nvPr>
+            <p:ph type="body" idx="1"/>
+          </p:nvPr>
+        </p:nvSpPr>
+        <p:spPr/>
+        <p:txBody>
+          <a:bodyPr/>
+          <a:lstStyle/>
+          <a:p>
+            <a:endParaRPr lang="hu-HU" dirty="0"/>
+          </a:p>
+        </p:txBody>
+      </p:sp>
+      <p:sp>
+        <p:nvSpPr>
+          <p:cNvPr id="4" name="Dia számának helye 3"/>
+          <p:cNvSpPr>
+            <a:spLocks noGrp="1"/>
+          </p:cNvSpPr>
+          <p:nvPr>
+            <p:ph type="sldNum" sz="quarter" idx="5"/>
+          </p:nvPr>
+        </p:nvSpPr>
+        <p:spPr/>
+        <p:txBody>
+          <a:bodyPr/>
+          <a:lstStyle/>
+          <a:p>
+            <a:fld id="{1CB59CB9-3FBD-4C6A-B95F-626319C0553F}" type="slidenum">
+              <a:rPr lang="hu-HU" smtClean="0"/>
+              <a:t>11</a:t>
             </a:fld>
             <a:endParaRPr lang="hu-HU"/>
           </a:p>
@@ -554,7 +864,7 @@
 </p:notes>
 </file>
 
-<file path=ppt/notesSlides/notesSlide2.xml><?xml version="1.0" encoding="utf-8"?>
+<file path=ppt/notesSlides/notesSlide5.xml><?xml version="1.0" encoding="utf-8"?>
 <p:notes xmlns:a="http://schemas.openxmlformats.org/drawingml/2006/main" xmlns:r="http://schemas.openxmlformats.org/officeDocument/2006/relationships" xmlns:p="http://schemas.openxmlformats.org/presentationml/2006/main">
   <p:cSld>
     <p:spTree>
@@ -643,7 +953,7 @@
           <a:p>
             <a:fld id="{1CB59CB9-3FBD-4C6A-B95F-626319C0553F}" type="slidenum">
               <a:rPr lang="hu-HU" smtClean="0"/>
-              <a:t>7</a:t>
+              <a:t>12</a:t>
             </a:fld>
             <a:endParaRPr lang="hu-HU"/>
           </a:p>
@@ -662,7 +972,7 @@
 </p:notes>
 </file>
 
-<file path=ppt/notesSlides/notesSlide3.xml><?xml version="1.0" encoding="utf-8"?>
+<file path=ppt/notesSlides/notesSlide6.xml><?xml version="1.0" encoding="utf-8"?>
 <p:notes xmlns:a="http://schemas.openxmlformats.org/drawingml/2006/main" xmlns:r="http://schemas.openxmlformats.org/officeDocument/2006/relationships" xmlns:p="http://schemas.openxmlformats.org/presentationml/2006/main">
   <p:cSld>
     <p:spTree>
@@ -751,7 +1061,7 @@
           <a:p>
             <a:fld id="{1CB59CB9-3FBD-4C6A-B95F-626319C0553F}" type="slidenum">
               <a:rPr lang="hu-HU" smtClean="0"/>
-              <a:t>8</a:t>
+              <a:t>13</a:t>
             </a:fld>
             <a:endParaRPr lang="hu-HU"/>
           </a:p>
@@ -770,7 +1080,7 @@
 </p:notes>
 </file>
 
-<file path=ppt/notesSlides/notesSlide4.xml><?xml version="1.0" encoding="utf-8"?>
+<file path=ppt/notesSlides/notesSlide7.xml><?xml version="1.0" encoding="utf-8"?>
 <p:notes xmlns:a="http://schemas.openxmlformats.org/drawingml/2006/main" xmlns:r="http://schemas.openxmlformats.org/officeDocument/2006/relationships" xmlns:p="http://schemas.openxmlformats.org/presentationml/2006/main">
   <p:cSld>
     <p:spTree>
@@ -859,7 +1169,7 @@
           <a:p>
             <a:fld id="{1CB59CB9-3FBD-4C6A-B95F-626319C0553F}" type="slidenum">
               <a:rPr lang="hu-HU" smtClean="0"/>
-              <a:t>9</a:t>
+              <a:t>14</a:t>
             </a:fld>
             <a:endParaRPr lang="hu-HU"/>
           </a:p>
@@ -878,7 +1188,7 @@
 </p:notes>
 </file>
 
-<file path=ppt/notesSlides/notesSlide5.xml><?xml version="1.0" encoding="utf-8"?>
+<file path=ppt/notesSlides/notesSlide8.xml><?xml version="1.0" encoding="utf-8"?>
 <p:notes xmlns:a="http://schemas.openxmlformats.org/drawingml/2006/main" xmlns:r="http://schemas.openxmlformats.org/officeDocument/2006/relationships" xmlns:p="http://schemas.openxmlformats.org/presentationml/2006/main">
   <p:cSld>
     <p:spTree>
@@ -967,7 +1277,7 @@
           <a:p>
             <a:fld id="{1CB59CB9-3FBD-4C6A-B95F-626319C0553F}" type="slidenum">
               <a:rPr lang="hu-HU" smtClean="0"/>
-              <a:t>10</a:t>
+              <a:t>15</a:t>
             </a:fld>
             <a:endParaRPr lang="hu-HU"/>
           </a:p>
@@ -986,7 +1296,7 @@
 </p:notes>
 </file>
 
-<file path=ppt/notesSlides/notesSlide6.xml><?xml version="1.0" encoding="utf-8"?>
+<file path=ppt/notesSlides/notesSlide9.xml><?xml version="1.0" encoding="utf-8"?>
 <p:notes xmlns:a="http://schemas.openxmlformats.org/drawingml/2006/main" xmlns:r="http://schemas.openxmlformats.org/officeDocument/2006/relationships" xmlns:p="http://schemas.openxmlformats.org/presentationml/2006/main">
   <p:cSld>
     <p:spTree>
@@ -1075,7 +1385,7 @@
           <a:p>
             <a:fld id="{1CB59CB9-3FBD-4C6A-B95F-626319C0553F}" type="slidenum">
               <a:rPr lang="hu-HU" smtClean="0"/>
-              <a:t>11</a:t>
+              <a:t>16</a:t>
             </a:fld>
             <a:endParaRPr lang="hu-HU"/>
           </a:p>
@@ -1280,7 +1590,7 @@
           <a:p>
             <a:fld id="{EAAC4D0F-E820-4ED5-BFE5-C7DE8876BBB6}" type="datetimeFigureOut">
               <a:rPr lang="hu-HU" smtClean="0"/>
-              <a:t>2025. 11. 17.</a:t>
+              <a:t>2025. 12. 07.</a:t>
             </a:fld>
             <a:endParaRPr lang="hu-HU"/>
           </a:p>
@@ -1555,7 +1865,7 @@
           <a:p>
             <a:fld id="{EAAC4D0F-E820-4ED5-BFE5-C7DE8876BBB6}" type="datetimeFigureOut">
               <a:rPr lang="hu-HU" smtClean="0"/>
-              <a:t>2025. 11. 17.</a:t>
+              <a:t>2025. 12. 07.</a:t>
             </a:fld>
             <a:endParaRPr lang="hu-HU"/>
           </a:p>
@@ -1749,7 +2059,7 @@
           <a:p>
             <a:fld id="{EAAC4D0F-E820-4ED5-BFE5-C7DE8876BBB6}" type="datetimeFigureOut">
               <a:rPr lang="hu-HU" smtClean="0"/>
-              <a:t>2025. 11. 17.</a:t>
+              <a:t>2025. 12. 07.</a:t>
             </a:fld>
             <a:endParaRPr lang="hu-HU"/>
           </a:p>
@@ -2020,7 +2330,7 @@
           <a:p>
             <a:fld id="{EAAC4D0F-E820-4ED5-BFE5-C7DE8876BBB6}" type="datetimeFigureOut">
               <a:rPr lang="hu-HU" smtClean="0"/>
-              <a:t>2025. 11. 17.</a:t>
+              <a:t>2025. 12. 07.</a:t>
             </a:fld>
             <a:endParaRPr lang="hu-HU"/>
           </a:p>
@@ -2347,7 +2657,7 @@
           <a:p>
             <a:fld id="{EAAC4D0F-E820-4ED5-BFE5-C7DE8876BBB6}" type="datetimeFigureOut">
               <a:rPr lang="hu-HU" smtClean="0"/>
-              <a:t>2025. 11. 17.</a:t>
+              <a:t>2025. 12. 07.</a:t>
             </a:fld>
             <a:endParaRPr lang="hu-HU"/>
           </a:p>
@@ -2966,7 +3276,7 @@
           <a:p>
             <a:fld id="{EAAC4D0F-E820-4ED5-BFE5-C7DE8876BBB6}" type="datetimeFigureOut">
               <a:rPr lang="hu-HU" smtClean="0"/>
-              <a:t>2025. 11. 17.</a:t>
+              <a:t>2025. 12. 07.</a:t>
             </a:fld>
             <a:endParaRPr lang="hu-HU"/>
           </a:p>
@@ -3813,7 +4123,7 @@
           <a:p>
             <a:fld id="{EAAC4D0F-E820-4ED5-BFE5-C7DE8876BBB6}" type="datetimeFigureOut">
               <a:rPr lang="hu-HU" smtClean="0"/>
-              <a:t>2025. 11. 17.</a:t>
+              <a:t>2025. 12. 07.</a:t>
             </a:fld>
             <a:endParaRPr lang="hu-HU"/>
           </a:p>
@@ -3983,7 +4293,7 @@
           <a:p>
             <a:fld id="{EAAC4D0F-E820-4ED5-BFE5-C7DE8876BBB6}" type="datetimeFigureOut">
               <a:rPr lang="hu-HU" smtClean="0"/>
-              <a:t>2025. 11. 17.</a:t>
+              <a:t>2025. 12. 07.</a:t>
             </a:fld>
             <a:endParaRPr lang="hu-HU"/>
           </a:p>
@@ -4163,7 +4473,7 @@
           <a:p>
             <a:fld id="{EAAC4D0F-E820-4ED5-BFE5-C7DE8876BBB6}" type="datetimeFigureOut">
               <a:rPr lang="hu-HU" smtClean="0"/>
-              <a:t>2025. 11. 17.</a:t>
+              <a:t>2025. 12. 07.</a:t>
             </a:fld>
             <a:endParaRPr lang="hu-HU"/>
           </a:p>
@@ -4333,7 +4643,7 @@
           <a:p>
             <a:fld id="{EAAC4D0F-E820-4ED5-BFE5-C7DE8876BBB6}" type="datetimeFigureOut">
               <a:rPr lang="hu-HU" smtClean="0"/>
-              <a:t>2025. 11. 17.</a:t>
+              <a:t>2025. 12. 07.</a:t>
             </a:fld>
             <a:endParaRPr lang="hu-HU"/>
           </a:p>
@@ -4580,7 +4890,7 @@
           <a:p>
             <a:fld id="{EAAC4D0F-E820-4ED5-BFE5-C7DE8876BBB6}" type="datetimeFigureOut">
               <a:rPr lang="hu-HU" smtClean="0"/>
-              <a:t>2025. 11. 17.</a:t>
+              <a:t>2025. 12. 07.</a:t>
             </a:fld>
             <a:endParaRPr lang="hu-HU"/>
           </a:p>
@@ -4872,7 +5182,7 @@
           <a:p>
             <a:fld id="{EAAC4D0F-E820-4ED5-BFE5-C7DE8876BBB6}" type="datetimeFigureOut">
               <a:rPr lang="hu-HU" smtClean="0"/>
-              <a:t>2025. 11. 17.</a:t>
+              <a:t>2025. 12. 07.</a:t>
             </a:fld>
             <a:endParaRPr lang="hu-HU"/>
           </a:p>
@@ -5316,7 +5626,7 @@
           <a:p>
             <a:fld id="{EAAC4D0F-E820-4ED5-BFE5-C7DE8876BBB6}" type="datetimeFigureOut">
               <a:rPr lang="hu-HU" smtClean="0"/>
-              <a:t>2025. 11. 17.</a:t>
+              <a:t>2025. 12. 07.</a:t>
             </a:fld>
             <a:endParaRPr lang="hu-HU"/>
           </a:p>
@@ -5434,7 +5744,7 @@
           <a:p>
             <a:fld id="{EAAC4D0F-E820-4ED5-BFE5-C7DE8876BBB6}" type="datetimeFigureOut">
               <a:rPr lang="hu-HU" smtClean="0"/>
-              <a:t>2025. 11. 17.</a:t>
+              <a:t>2025. 12. 07.</a:t>
             </a:fld>
             <a:endParaRPr lang="hu-HU"/>
           </a:p>
@@ -5529,7 +5839,7 @@
           <a:p>
             <a:fld id="{EAAC4D0F-E820-4ED5-BFE5-C7DE8876BBB6}" type="datetimeFigureOut">
               <a:rPr lang="hu-HU" smtClean="0"/>
-              <a:t>2025. 11. 17.</a:t>
+              <a:t>2025. 12. 07.</a:t>
             </a:fld>
             <a:endParaRPr lang="hu-HU"/>
           </a:p>
@@ -5808,7 +6118,7 @@
           <a:p>
             <a:fld id="{EAAC4D0F-E820-4ED5-BFE5-C7DE8876BBB6}" type="datetimeFigureOut">
               <a:rPr lang="hu-HU" smtClean="0"/>
-              <a:t>2025. 11. 17.</a:t>
+              <a:t>2025. 12. 07.</a:t>
             </a:fld>
             <a:endParaRPr lang="hu-HU"/>
           </a:p>
@@ -6083,7 +6393,7 @@
           <a:p>
             <a:fld id="{EAAC4D0F-E820-4ED5-BFE5-C7DE8876BBB6}" type="datetimeFigureOut">
               <a:rPr lang="hu-HU" smtClean="0"/>
-              <a:t>2025. 11. 17.</a:t>
+              <a:t>2025. 12. 07.</a:t>
             </a:fld>
             <a:endParaRPr lang="hu-HU"/>
           </a:p>
@@ -6280,6 +6590,13 @@
             <a:schemeClr val="lt1"/>
           </a:fontRef>
         </p:style>
+        <p:txBody>
+          <a:bodyPr/>
+          <a:lstStyle/>
+          <a:p>
+            <a:endParaRPr lang="hu-HU"/>
+          </a:p>
+        </p:txBody>
       </p:sp>
       <p:pic>
         <p:nvPicPr>
@@ -6374,6 +6691,13 @@
             <a:schemeClr val="lt1"/>
           </a:fontRef>
         </p:style>
+        <p:txBody>
+          <a:bodyPr/>
+          <a:lstStyle/>
+          <a:p>
+            <a:endParaRPr lang="hu-HU"/>
+          </a:p>
+        </p:txBody>
       </p:sp>
       <p:sp>
         <p:nvSpPr>
@@ -6506,7 +6830,7 @@
           <a:p>
             <a:fld id="{EAAC4D0F-E820-4ED5-BFE5-C7DE8876BBB6}" type="datetimeFigureOut">
               <a:rPr lang="hu-HU" smtClean="0"/>
-              <a:t>2025. 11. 17.</a:t>
+              <a:t>2025. 12. 07.</a:t>
             </a:fld>
             <a:endParaRPr lang="hu-HU"/>
           </a:p>
@@ -7093,6 +7417,360 @@
         <p:cNvPr id="1" name="">
           <a:extLst>
             <a:ext uri="{FF2B5EF4-FFF2-40B4-BE49-F238E27FC236}">
+              <a16:creationId xmlns:a16="http://schemas.microsoft.com/office/drawing/2014/main" id="{0B0F1546-899D-A56E-6B5E-4FB46E7DBF5C}"/>
+            </a:ext>
+          </a:extLst>
+        </p:cNvPr>
+        <p:cNvGrpSpPr/>
+        <p:nvPr/>
+      </p:nvGrpSpPr>
+      <p:grpSpPr>
+        <a:xfrm>
+          <a:off x="0" y="0"/>
+          <a:ext cx="0" cy="0"/>
+          <a:chOff x="0" y="0"/>
+          <a:chExt cx="0" cy="0"/>
+        </a:xfrm>
+      </p:grpSpPr>
+      <p:pic>
+        <p:nvPicPr>
+          <p:cNvPr id="4" name="Kép 3" descr="A képen szöveg, képernyőkép, szoftver látható&#10;&#10;Előfordulhat, hogy az AI által létrehozott tartalom helytelen.">
+            <a:extLst>
+              <a:ext uri="{FF2B5EF4-FFF2-40B4-BE49-F238E27FC236}">
+                <a16:creationId xmlns:a16="http://schemas.microsoft.com/office/drawing/2014/main" id="{CD4C5428-C36F-E8CD-9853-AF19C5537FC6}"/>
+              </a:ext>
+            </a:extLst>
+          </p:cNvPr>
+          <p:cNvPicPr>
+            <a:picLocks noChangeAspect="1"/>
+          </p:cNvPicPr>
+          <p:nvPr/>
+        </p:nvPicPr>
+        <p:blipFill>
+          <a:blip r:embed="rId2"/>
+          <a:stretch>
+            <a:fillRect/>
+          </a:stretch>
+        </p:blipFill>
+        <p:spPr>
+          <a:xfrm>
+            <a:off x="1649344" y="281667"/>
+            <a:ext cx="8893311" cy="6294665"/>
+          </a:xfrm>
+          <a:prstGeom prst="rect">
+            <a:avLst/>
+          </a:prstGeom>
+        </p:spPr>
+      </p:pic>
+    </p:spTree>
+    <p:extLst>
+      <p:ext uri="{BB962C8B-B14F-4D97-AF65-F5344CB8AC3E}">
+        <p14:creationId xmlns:p14="http://schemas.microsoft.com/office/powerpoint/2010/main" val="2004753628"/>
+      </p:ext>
+    </p:extLst>
+  </p:cSld>
+  <p:clrMapOvr>
+    <a:masterClrMapping/>
+  </p:clrMapOvr>
+</p:sld>
+</file>
+
+<file path=ppt/slides/slide11.xml><?xml version="1.0" encoding="utf-8"?>
+<p:sld xmlns:a="http://schemas.openxmlformats.org/drawingml/2006/main" xmlns:r="http://schemas.openxmlformats.org/officeDocument/2006/relationships" xmlns:p="http://schemas.openxmlformats.org/presentationml/2006/main">
+  <p:cSld>
+    <p:spTree>
+      <p:nvGrpSpPr>
+        <p:cNvPr id="1" name="">
+          <a:extLst>
+            <a:ext uri="{FF2B5EF4-FFF2-40B4-BE49-F238E27FC236}">
+              <a16:creationId xmlns:a16="http://schemas.microsoft.com/office/drawing/2014/main" id="{3324A8F7-CB10-0929-2075-7402F5C6E2E4}"/>
+            </a:ext>
+          </a:extLst>
+        </p:cNvPr>
+        <p:cNvGrpSpPr/>
+        <p:nvPr/>
+      </p:nvGrpSpPr>
+      <p:grpSpPr>
+        <a:xfrm>
+          <a:off x="0" y="0"/>
+          <a:ext cx="0" cy="0"/>
+          <a:chOff x="0" y="0"/>
+          <a:chExt cx="0" cy="0"/>
+        </a:xfrm>
+      </p:grpSpPr>
+      <p:pic>
+        <p:nvPicPr>
+          <p:cNvPr id="4" name="Kép 3" descr="A képen képernyőkép, lila látható&#10;&#10;Előfordulhat, hogy az AI által létrehozott tartalom helytelen.">
+            <a:extLst>
+              <a:ext uri="{FF2B5EF4-FFF2-40B4-BE49-F238E27FC236}">
+                <a16:creationId xmlns:a16="http://schemas.microsoft.com/office/drawing/2014/main" id="{26630B3E-7905-3A81-90C7-BC31551585D5}"/>
+              </a:ext>
+            </a:extLst>
+          </p:cNvPr>
+          <p:cNvPicPr>
+            <a:picLocks noChangeAspect="1"/>
+          </p:cNvPicPr>
+          <p:nvPr/>
+        </p:nvPicPr>
+        <p:blipFill>
+          <a:blip r:embed="rId3">
+            <a:extLst>
+              <a:ext uri="{28A0092B-C50C-407E-A947-70E740481C1C}">
+                <a14:useLocalDpi xmlns:a14="http://schemas.microsoft.com/office/drawing/2010/main" val="0"/>
+              </a:ext>
+            </a:extLst>
+          </a:blip>
+          <a:stretch>
+            <a:fillRect/>
+          </a:stretch>
+        </p:blipFill>
+        <p:spPr>
+          <a:xfrm>
+            <a:off x="1963989" y="1098214"/>
+            <a:ext cx="8264022" cy="4661571"/>
+          </a:xfrm>
+          <a:prstGeom prst="rect">
+            <a:avLst/>
+          </a:prstGeom>
+        </p:spPr>
+      </p:pic>
+    </p:spTree>
+    <p:extLst>
+      <p:ext uri="{BB962C8B-B14F-4D97-AF65-F5344CB8AC3E}">
+        <p14:creationId xmlns:p14="http://schemas.microsoft.com/office/powerpoint/2010/main" val="3411416098"/>
+      </p:ext>
+    </p:extLst>
+  </p:cSld>
+  <p:clrMapOvr>
+    <a:masterClrMapping/>
+  </p:clrMapOvr>
+</p:sld>
+</file>
+
+<file path=ppt/slides/slide12.xml><?xml version="1.0" encoding="utf-8"?>
+<p:sld xmlns:a="http://schemas.openxmlformats.org/drawingml/2006/main" xmlns:r="http://schemas.openxmlformats.org/officeDocument/2006/relationships" xmlns:p="http://schemas.openxmlformats.org/presentationml/2006/main">
+  <p:cSld>
+    <p:spTree>
+      <p:nvGrpSpPr>
+        <p:cNvPr id="1" name="">
+          <a:extLst>
+            <a:ext uri="{FF2B5EF4-FFF2-40B4-BE49-F238E27FC236}">
+              <a16:creationId xmlns:a16="http://schemas.microsoft.com/office/drawing/2014/main" id="{87004B1A-1514-77B2-13D8-2A831FEEFEAB}"/>
+            </a:ext>
+          </a:extLst>
+        </p:cNvPr>
+        <p:cNvGrpSpPr/>
+        <p:nvPr/>
+      </p:nvGrpSpPr>
+      <p:grpSpPr>
+        <a:xfrm>
+          <a:off x="0" y="0"/>
+          <a:ext cx="0" cy="0"/>
+          <a:chOff x="0" y="0"/>
+          <a:chExt cx="0" cy="0"/>
+        </a:xfrm>
+      </p:grpSpPr>
+      <p:pic>
+        <p:nvPicPr>
+          <p:cNvPr id="8" name="Kép 7" descr="A képen szöveg, képernyőkép, szoftver, képernyő látható&#10;&#10;Előfordulhat, hogy az AI által létrehozott tartalom helytelen.">
+            <a:extLst>
+              <a:ext uri="{FF2B5EF4-FFF2-40B4-BE49-F238E27FC236}">
+                <a16:creationId xmlns:a16="http://schemas.microsoft.com/office/drawing/2014/main" id="{DF8662D7-2118-A6BC-24CD-8CCC9600DE7E}"/>
+              </a:ext>
+            </a:extLst>
+          </p:cNvPr>
+          <p:cNvPicPr>
+            <a:picLocks noChangeAspect="1"/>
+          </p:cNvPicPr>
+          <p:nvPr/>
+        </p:nvPicPr>
+        <p:blipFill>
+          <a:blip r:embed="rId3">
+            <a:extLst>
+              <a:ext uri="{28A0092B-C50C-407E-A947-70E740481C1C}">
+                <a14:useLocalDpi xmlns:a14="http://schemas.microsoft.com/office/drawing/2010/main" val="0"/>
+              </a:ext>
+            </a:extLst>
+          </a:blip>
+          <a:stretch>
+            <a:fillRect/>
+          </a:stretch>
+        </p:blipFill>
+        <p:spPr>
+          <a:xfrm>
+            <a:off x="2228887" y="844815"/>
+            <a:ext cx="7734226" cy="5168369"/>
+          </a:xfrm>
+          <a:prstGeom prst="rect">
+            <a:avLst/>
+          </a:prstGeom>
+        </p:spPr>
+      </p:pic>
+    </p:spTree>
+    <p:extLst>
+      <p:ext uri="{BB962C8B-B14F-4D97-AF65-F5344CB8AC3E}">
+        <p14:creationId xmlns:p14="http://schemas.microsoft.com/office/powerpoint/2010/main" val="2274802669"/>
+      </p:ext>
+    </p:extLst>
+  </p:cSld>
+  <p:clrMapOvr>
+    <a:masterClrMapping/>
+  </p:clrMapOvr>
+</p:sld>
+</file>
+
+<file path=ppt/slides/slide13.xml><?xml version="1.0" encoding="utf-8"?>
+<p:sld xmlns:a="http://schemas.openxmlformats.org/drawingml/2006/main" xmlns:r="http://schemas.openxmlformats.org/officeDocument/2006/relationships" xmlns:p="http://schemas.openxmlformats.org/presentationml/2006/main">
+  <p:cSld>
+    <p:spTree>
+      <p:nvGrpSpPr>
+        <p:cNvPr id="1" name="">
+          <a:extLst>
+            <a:ext uri="{FF2B5EF4-FFF2-40B4-BE49-F238E27FC236}">
+              <a16:creationId xmlns:a16="http://schemas.microsoft.com/office/drawing/2014/main" id="{34090B57-E674-E71B-F7F3-1BCAB5102BF8}"/>
+            </a:ext>
+          </a:extLst>
+        </p:cNvPr>
+        <p:cNvGrpSpPr/>
+        <p:nvPr/>
+      </p:nvGrpSpPr>
+      <p:grpSpPr>
+        <a:xfrm>
+          <a:off x="0" y="0"/>
+          <a:ext cx="0" cy="0"/>
+          <a:chOff x="0" y="0"/>
+          <a:chExt cx="0" cy="0"/>
+        </a:xfrm>
+      </p:grpSpPr>
+      <p:pic>
+        <p:nvPicPr>
+          <p:cNvPr id="3" name="Kép 2" descr="A képen szöveg, képernyőkép, szoftver, képernyő látható&#10;&#10;Előfordulhat, hogy az AI által létrehozott tartalom helytelen.">
+            <a:extLst>
+              <a:ext uri="{FF2B5EF4-FFF2-40B4-BE49-F238E27FC236}">
+                <a16:creationId xmlns:a16="http://schemas.microsoft.com/office/drawing/2014/main" id="{D6154DE2-0C93-79C5-0777-3BE43FA4EDC2}"/>
+              </a:ext>
+            </a:extLst>
+          </p:cNvPr>
+          <p:cNvPicPr>
+            <a:picLocks noChangeAspect="1"/>
+          </p:cNvPicPr>
+          <p:nvPr/>
+        </p:nvPicPr>
+        <p:blipFill>
+          <a:blip r:embed="rId3">
+            <a:extLst>
+              <a:ext uri="{28A0092B-C50C-407E-A947-70E740481C1C}">
+                <a14:useLocalDpi xmlns:a14="http://schemas.microsoft.com/office/drawing/2010/main" val="0"/>
+              </a:ext>
+            </a:extLst>
+          </a:blip>
+          <a:stretch>
+            <a:fillRect/>
+          </a:stretch>
+        </p:blipFill>
+        <p:spPr>
+          <a:xfrm>
+            <a:off x="2206038" y="776163"/>
+            <a:ext cx="7779923" cy="5305674"/>
+          </a:xfrm>
+          <a:prstGeom prst="rect">
+            <a:avLst/>
+          </a:prstGeom>
+        </p:spPr>
+      </p:pic>
+    </p:spTree>
+    <p:extLst>
+      <p:ext uri="{BB962C8B-B14F-4D97-AF65-F5344CB8AC3E}">
+        <p14:creationId xmlns:p14="http://schemas.microsoft.com/office/powerpoint/2010/main" val="268667730"/>
+      </p:ext>
+    </p:extLst>
+  </p:cSld>
+  <p:clrMapOvr>
+    <a:masterClrMapping/>
+  </p:clrMapOvr>
+</p:sld>
+</file>
+
+<file path=ppt/slides/slide14.xml><?xml version="1.0" encoding="utf-8"?>
+<p:sld xmlns:a="http://schemas.openxmlformats.org/drawingml/2006/main" xmlns:r="http://schemas.openxmlformats.org/officeDocument/2006/relationships" xmlns:p="http://schemas.openxmlformats.org/presentationml/2006/main">
+  <p:cSld>
+    <p:spTree>
+      <p:nvGrpSpPr>
+        <p:cNvPr id="1" name="">
+          <a:extLst>
+            <a:ext uri="{FF2B5EF4-FFF2-40B4-BE49-F238E27FC236}">
+              <a16:creationId xmlns:a16="http://schemas.microsoft.com/office/drawing/2014/main" id="{0BF6E4E5-21F8-CA9D-0A1D-DE0B78067AF8}"/>
+            </a:ext>
+          </a:extLst>
+        </p:cNvPr>
+        <p:cNvGrpSpPr/>
+        <p:nvPr/>
+      </p:nvGrpSpPr>
+      <p:grpSpPr>
+        <a:xfrm>
+          <a:off x="0" y="0"/>
+          <a:ext cx="0" cy="0"/>
+          <a:chOff x="0" y="0"/>
+          <a:chExt cx="0" cy="0"/>
+        </a:xfrm>
+      </p:grpSpPr>
+      <p:pic>
+        <p:nvPicPr>
+          <p:cNvPr id="6" name="Kép 5" descr="A képen szöveg, képernyőkép, szoftver, Betűtípus látható&#10;&#10;Előfordulhat, hogy az AI által létrehozott tartalom helytelen.">
+            <a:extLst>
+              <a:ext uri="{FF2B5EF4-FFF2-40B4-BE49-F238E27FC236}">
+                <a16:creationId xmlns:a16="http://schemas.microsoft.com/office/drawing/2014/main" id="{6DB1633A-C8C3-A2CA-9184-C726A5007032}"/>
+              </a:ext>
+            </a:extLst>
+          </p:cNvPr>
+          <p:cNvPicPr>
+            <a:picLocks noChangeAspect="1"/>
+          </p:cNvPicPr>
+          <p:nvPr/>
+        </p:nvPicPr>
+        <p:blipFill>
+          <a:blip r:embed="rId3">
+            <a:extLst>
+              <a:ext uri="{28A0092B-C50C-407E-A947-70E740481C1C}">
+                <a14:useLocalDpi xmlns:a14="http://schemas.microsoft.com/office/drawing/2010/main" val="0"/>
+              </a:ext>
+            </a:extLst>
+          </a:blip>
+          <a:stretch>
+            <a:fillRect/>
+          </a:stretch>
+        </p:blipFill>
+        <p:spPr>
+          <a:xfrm>
+            <a:off x="2723858" y="807493"/>
+            <a:ext cx="6744284" cy="5243014"/>
+          </a:xfrm>
+          <a:prstGeom prst="rect">
+            <a:avLst/>
+          </a:prstGeom>
+        </p:spPr>
+      </p:pic>
+    </p:spTree>
+    <p:extLst>
+      <p:ext uri="{BB962C8B-B14F-4D97-AF65-F5344CB8AC3E}">
+        <p14:creationId xmlns:p14="http://schemas.microsoft.com/office/powerpoint/2010/main" val="2527925348"/>
+      </p:ext>
+    </p:extLst>
+  </p:cSld>
+  <p:clrMapOvr>
+    <a:masterClrMapping/>
+  </p:clrMapOvr>
+</p:sld>
+</file>
+
+<file path=ppt/slides/slide15.xml><?xml version="1.0" encoding="utf-8"?>
+<p:sld xmlns:a="http://schemas.openxmlformats.org/drawingml/2006/main" xmlns:r="http://schemas.openxmlformats.org/officeDocument/2006/relationships" xmlns:p="http://schemas.openxmlformats.org/presentationml/2006/main">
+  <p:cSld>
+    <p:spTree>
+      <p:nvGrpSpPr>
+        <p:cNvPr id="1" name="">
+          <a:extLst>
+            <a:ext uri="{FF2B5EF4-FFF2-40B4-BE49-F238E27FC236}">
               <a16:creationId xmlns:a16="http://schemas.microsoft.com/office/drawing/2014/main" id="{0292DD2F-2BE2-22A6-3323-149483C659C9}"/>
             </a:ext>
           </a:extLst>
@@ -7157,7 +7835,7 @@
 </p:sld>
 </file>
 
-<file path=ppt/slides/slide11.xml><?xml version="1.0" encoding="utf-8"?>
+<file path=ppt/slides/slide16.xml><?xml version="1.0" encoding="utf-8"?>
 <p:sld xmlns:a="http://schemas.openxmlformats.org/drawingml/2006/main" xmlns:r="http://schemas.openxmlformats.org/officeDocument/2006/relationships" xmlns:p="http://schemas.openxmlformats.org/presentationml/2006/main">
   <p:cSld>
     <p:spTree>
@@ -7229,7 +7907,7 @@
 </p:sld>
 </file>
 
-<file path=ppt/slides/slide12.xml><?xml version="1.0" encoding="utf-8"?>
+<file path=ppt/slides/slide17.xml><?xml version="1.0" encoding="utf-8"?>
 <p:sld xmlns:a="http://schemas.openxmlformats.org/drawingml/2006/main" xmlns:r="http://schemas.openxmlformats.org/officeDocument/2006/relationships" xmlns:p="http://schemas.openxmlformats.org/presentationml/2006/main">
   <p:cSld>
     <p:spTree>
@@ -7300,6 +7978,1025 @@
 </file>
 
 <file path=ppt/slides/slide2.xml><?xml version="1.0" encoding="utf-8"?>
+<p:sld xmlns:a="http://schemas.openxmlformats.org/drawingml/2006/main" xmlns:r="http://schemas.openxmlformats.org/officeDocument/2006/relationships" xmlns:p="http://schemas.openxmlformats.org/presentationml/2006/main">
+  <p:cSld>
+    <p:spTree>
+      <p:nvGrpSpPr>
+        <p:cNvPr id="1" name=""/>
+        <p:cNvGrpSpPr/>
+        <p:nvPr/>
+      </p:nvGrpSpPr>
+      <p:grpSpPr>
+        <a:xfrm>
+          <a:off x="0" y="0"/>
+          <a:ext cx="0" cy="0"/>
+          <a:chOff x="0" y="0"/>
+          <a:chExt cx="0" cy="0"/>
+        </a:xfrm>
+      </p:grpSpPr>
+      <p:pic>
+        <p:nvPicPr>
+          <p:cNvPr id="5" name="Kép 4" descr="A képen szöveg, képernyőkép, szoftver látható&#10;&#10;Előfordulhat, hogy az AI által létrehozott tartalom helytelen.">
+            <a:extLst>
+              <a:ext uri="{FF2B5EF4-FFF2-40B4-BE49-F238E27FC236}">
+                <a16:creationId xmlns:a16="http://schemas.microsoft.com/office/drawing/2014/main" id="{7C5D3889-EC38-F95B-83A8-AAF253C4348A}"/>
+              </a:ext>
+            </a:extLst>
+          </p:cNvPr>
+          <p:cNvPicPr>
+            <a:picLocks noChangeAspect="1"/>
+          </p:cNvPicPr>
+          <p:nvPr/>
+        </p:nvPicPr>
+        <p:blipFill>
+          <a:blip r:embed="rId3"/>
+          <a:stretch>
+            <a:fillRect/>
+          </a:stretch>
+        </p:blipFill>
+        <p:spPr>
+          <a:xfrm>
+            <a:off x="88492" y="3709352"/>
+            <a:ext cx="5919017" cy="3012818"/>
+          </a:xfrm>
+          <a:prstGeom prst="rect">
+            <a:avLst/>
+          </a:prstGeom>
+        </p:spPr>
+      </p:pic>
+      <p:pic>
+        <p:nvPicPr>
+          <p:cNvPr id="7" name="Kép 6" descr="A képen szöveg, képernyőkép, szoftver látható&#10;&#10;Előfordulhat, hogy az AI által létrehozott tartalom helytelen.">
+            <a:extLst>
+              <a:ext uri="{FF2B5EF4-FFF2-40B4-BE49-F238E27FC236}">
+                <a16:creationId xmlns:a16="http://schemas.microsoft.com/office/drawing/2014/main" id="{B3475642-B010-4E28-1451-70C7525C0DD6}"/>
+              </a:ext>
+            </a:extLst>
+          </p:cNvPr>
+          <p:cNvPicPr>
+            <a:picLocks noChangeAspect="1"/>
+          </p:cNvPicPr>
+          <p:nvPr/>
+        </p:nvPicPr>
+        <p:blipFill>
+          <a:blip r:embed="rId4"/>
+          <a:stretch>
+            <a:fillRect/>
+          </a:stretch>
+        </p:blipFill>
+        <p:spPr>
+          <a:xfrm>
+            <a:off x="88492" y="598212"/>
+            <a:ext cx="5919017" cy="3012818"/>
+          </a:xfrm>
+          <a:prstGeom prst="rect">
+            <a:avLst/>
+          </a:prstGeom>
+        </p:spPr>
+      </p:pic>
+      <p:pic>
+        <p:nvPicPr>
+          <p:cNvPr id="9" name="Kép 8" descr="A képen szöveg, képernyőkép, szoftver, Multimédiás szoftver látható&#10;&#10;Előfordulhat, hogy az AI által létrehozott tartalom helytelen.">
+            <a:extLst>
+              <a:ext uri="{FF2B5EF4-FFF2-40B4-BE49-F238E27FC236}">
+                <a16:creationId xmlns:a16="http://schemas.microsoft.com/office/drawing/2014/main" id="{017896AC-8B60-25F2-2604-E3C29D0F1057}"/>
+              </a:ext>
+            </a:extLst>
+          </p:cNvPr>
+          <p:cNvPicPr>
+            <a:picLocks noChangeAspect="1"/>
+          </p:cNvPicPr>
+          <p:nvPr/>
+        </p:nvPicPr>
+        <p:blipFill>
+          <a:blip r:embed="rId5"/>
+          <a:stretch>
+            <a:fillRect/>
+          </a:stretch>
+        </p:blipFill>
+        <p:spPr>
+          <a:xfrm>
+            <a:off x="6096000" y="598212"/>
+            <a:ext cx="5919016" cy="3012818"/>
+          </a:xfrm>
+          <a:prstGeom prst="rect">
+            <a:avLst/>
+          </a:prstGeom>
+        </p:spPr>
+      </p:pic>
+      <p:pic>
+        <p:nvPicPr>
+          <p:cNvPr id="11" name="Kép 10" descr="A képen szöveg, képernyőkép, szoftver, Multimédiás szoftver látható&#10;&#10;Előfordulhat, hogy az AI által létrehozott tartalom helytelen.">
+            <a:extLst>
+              <a:ext uri="{FF2B5EF4-FFF2-40B4-BE49-F238E27FC236}">
+                <a16:creationId xmlns:a16="http://schemas.microsoft.com/office/drawing/2014/main" id="{7271C0F0-8633-5865-B0F8-0DB1708A43B5}"/>
+              </a:ext>
+            </a:extLst>
+          </p:cNvPr>
+          <p:cNvPicPr>
+            <a:picLocks noChangeAspect="1"/>
+          </p:cNvPicPr>
+          <p:nvPr/>
+        </p:nvPicPr>
+        <p:blipFill>
+          <a:blip r:embed="rId6"/>
+          <a:stretch>
+            <a:fillRect/>
+          </a:stretch>
+        </p:blipFill>
+        <p:spPr>
+          <a:xfrm>
+            <a:off x="6096000" y="3709352"/>
+            <a:ext cx="5919016" cy="3012818"/>
+          </a:xfrm>
+          <a:prstGeom prst="rect">
+            <a:avLst/>
+          </a:prstGeom>
+        </p:spPr>
+      </p:pic>
+      <p:sp>
+        <p:nvSpPr>
+          <p:cNvPr id="12" name="Cím 1">
+            <a:extLst>
+              <a:ext uri="{FF2B5EF4-FFF2-40B4-BE49-F238E27FC236}">
+                <a16:creationId xmlns:a16="http://schemas.microsoft.com/office/drawing/2014/main" id="{C1148EB5-BF6B-7238-275E-EF027BC9F311}"/>
+              </a:ext>
+            </a:extLst>
+          </p:cNvPr>
+          <p:cNvSpPr txBox="1">
+            <a:spLocks/>
+          </p:cNvSpPr>
+          <p:nvPr/>
+        </p:nvSpPr>
+        <p:spPr>
+          <a:xfrm>
+            <a:off x="1776524" y="83662"/>
+            <a:ext cx="8638951" cy="514550"/>
+          </a:xfrm>
+          <a:prstGeom prst="rect">
+            <a:avLst/>
+          </a:prstGeom>
+        </p:spPr>
+        <p:txBody>
+          <a:bodyPr vert="horz" lIns="91440" tIns="45720" rIns="91440" bIns="45720" rtlCol="0" anchor="t">
+            <a:noAutofit/>
+          </a:bodyPr>
+          <a:lstStyle>
+            <a:lvl1pPr algn="l" defTabSz="457200" rtl="0" eaLnBrk="1" latinLnBrk="0" hangingPunct="1">
+              <a:spcBef>
+                <a:spcPct val="0"/>
+              </a:spcBef>
+              <a:buNone/>
+              <a:defRPr sz="4200" b="0" i="0" kern="1200">
+                <a:solidFill>
+                  <a:schemeClr val="tx2"/>
+                </a:solidFill>
+                <a:latin typeface="+mj-lt"/>
+                <a:ea typeface="+mj-ea"/>
+                <a:cs typeface="+mj-cs"/>
+              </a:defRPr>
+            </a:lvl1pPr>
+            <a:lvl2pPr eaLnBrk="1" hangingPunct="1">
+              <a:defRPr>
+                <a:solidFill>
+                  <a:schemeClr val="tx2"/>
+                </a:solidFill>
+              </a:defRPr>
+            </a:lvl2pPr>
+            <a:lvl3pPr eaLnBrk="1" hangingPunct="1">
+              <a:defRPr>
+                <a:solidFill>
+                  <a:schemeClr val="tx2"/>
+                </a:solidFill>
+              </a:defRPr>
+            </a:lvl3pPr>
+            <a:lvl4pPr eaLnBrk="1" hangingPunct="1">
+              <a:defRPr>
+                <a:solidFill>
+                  <a:schemeClr val="tx2"/>
+                </a:solidFill>
+              </a:defRPr>
+            </a:lvl4pPr>
+            <a:lvl5pPr eaLnBrk="1" hangingPunct="1">
+              <a:defRPr>
+                <a:solidFill>
+                  <a:schemeClr val="tx2"/>
+                </a:solidFill>
+              </a:defRPr>
+            </a:lvl5pPr>
+            <a:lvl6pPr eaLnBrk="1" hangingPunct="1">
+              <a:defRPr>
+                <a:solidFill>
+                  <a:schemeClr val="tx2"/>
+                </a:solidFill>
+              </a:defRPr>
+            </a:lvl6pPr>
+            <a:lvl7pPr eaLnBrk="1" hangingPunct="1">
+              <a:defRPr>
+                <a:solidFill>
+                  <a:schemeClr val="tx2"/>
+                </a:solidFill>
+              </a:defRPr>
+            </a:lvl7pPr>
+            <a:lvl8pPr eaLnBrk="1" hangingPunct="1">
+              <a:defRPr>
+                <a:solidFill>
+                  <a:schemeClr val="tx2"/>
+                </a:solidFill>
+              </a:defRPr>
+            </a:lvl8pPr>
+            <a:lvl9pPr eaLnBrk="1" hangingPunct="1">
+              <a:defRPr>
+                <a:solidFill>
+                  <a:schemeClr val="tx2"/>
+                </a:solidFill>
+              </a:defRPr>
+            </a:lvl9pPr>
+          </a:lstStyle>
+          <a:p>
+            <a:pPr algn="ctr"/>
+            <a:r>
+              <a:rPr lang="hu-HU" sz="3200" dirty="0" err="1"/>
+              <a:t>Commitok</a:t>
+            </a:r>
+            <a:endParaRPr lang="hu-HU" dirty="0"/>
+          </a:p>
+        </p:txBody>
+      </p:sp>
+    </p:spTree>
+    <p:extLst>
+      <p:ext uri="{BB962C8B-B14F-4D97-AF65-F5344CB8AC3E}">
+        <p14:creationId xmlns:p14="http://schemas.microsoft.com/office/powerpoint/2010/main" val="3460426518"/>
+      </p:ext>
+    </p:extLst>
+  </p:cSld>
+  <p:clrMapOvr>
+    <a:masterClrMapping/>
+  </p:clrMapOvr>
+</p:sld>
+</file>
+
+<file path=ppt/slides/slide3.xml><?xml version="1.0" encoding="utf-8"?>
+<p:sld xmlns:a="http://schemas.openxmlformats.org/drawingml/2006/main" xmlns:r="http://schemas.openxmlformats.org/officeDocument/2006/relationships" xmlns:p="http://schemas.openxmlformats.org/presentationml/2006/main">
+  <p:cSld>
+    <p:spTree>
+      <p:nvGrpSpPr>
+        <p:cNvPr id="1" name="">
+          <a:extLst>
+            <a:ext uri="{FF2B5EF4-FFF2-40B4-BE49-F238E27FC236}">
+              <a16:creationId xmlns:a16="http://schemas.microsoft.com/office/drawing/2014/main" id="{A5A26356-7FC3-2256-E53B-6AE6E80C8C53}"/>
+            </a:ext>
+          </a:extLst>
+        </p:cNvPr>
+        <p:cNvGrpSpPr/>
+        <p:nvPr/>
+      </p:nvGrpSpPr>
+      <p:grpSpPr>
+        <a:xfrm>
+          <a:off x="0" y="0"/>
+          <a:ext cx="0" cy="0"/>
+          <a:chOff x="0" y="0"/>
+          <a:chExt cx="0" cy="0"/>
+        </a:xfrm>
+      </p:grpSpPr>
+      <p:sp>
+        <p:nvSpPr>
+          <p:cNvPr id="12" name="Cím 1">
+            <a:extLst>
+              <a:ext uri="{FF2B5EF4-FFF2-40B4-BE49-F238E27FC236}">
+                <a16:creationId xmlns:a16="http://schemas.microsoft.com/office/drawing/2014/main" id="{FE20AD3E-2D77-7B61-6CC0-F821C4281B06}"/>
+              </a:ext>
+            </a:extLst>
+          </p:cNvPr>
+          <p:cNvSpPr txBox="1">
+            <a:spLocks/>
+          </p:cNvSpPr>
+          <p:nvPr/>
+        </p:nvSpPr>
+        <p:spPr>
+          <a:xfrm>
+            <a:off x="1776524" y="83662"/>
+            <a:ext cx="8638951" cy="514550"/>
+          </a:xfrm>
+          <a:prstGeom prst="rect">
+            <a:avLst/>
+          </a:prstGeom>
+        </p:spPr>
+        <p:txBody>
+          <a:bodyPr vert="horz" lIns="91440" tIns="45720" rIns="91440" bIns="45720" rtlCol="0" anchor="t">
+            <a:noAutofit/>
+          </a:bodyPr>
+          <a:lstStyle>
+            <a:lvl1pPr algn="l" defTabSz="457200" rtl="0" eaLnBrk="1" latinLnBrk="0" hangingPunct="1">
+              <a:spcBef>
+                <a:spcPct val="0"/>
+              </a:spcBef>
+              <a:buNone/>
+              <a:defRPr sz="4200" b="0" i="0" kern="1200">
+                <a:solidFill>
+                  <a:schemeClr val="tx2"/>
+                </a:solidFill>
+                <a:latin typeface="+mj-lt"/>
+                <a:ea typeface="+mj-ea"/>
+                <a:cs typeface="+mj-cs"/>
+              </a:defRPr>
+            </a:lvl1pPr>
+            <a:lvl2pPr eaLnBrk="1" hangingPunct="1">
+              <a:defRPr>
+                <a:solidFill>
+                  <a:schemeClr val="tx2"/>
+                </a:solidFill>
+              </a:defRPr>
+            </a:lvl2pPr>
+            <a:lvl3pPr eaLnBrk="1" hangingPunct="1">
+              <a:defRPr>
+                <a:solidFill>
+                  <a:schemeClr val="tx2"/>
+                </a:solidFill>
+              </a:defRPr>
+            </a:lvl3pPr>
+            <a:lvl4pPr eaLnBrk="1" hangingPunct="1">
+              <a:defRPr>
+                <a:solidFill>
+                  <a:schemeClr val="tx2"/>
+                </a:solidFill>
+              </a:defRPr>
+            </a:lvl4pPr>
+            <a:lvl5pPr eaLnBrk="1" hangingPunct="1">
+              <a:defRPr>
+                <a:solidFill>
+                  <a:schemeClr val="tx2"/>
+                </a:solidFill>
+              </a:defRPr>
+            </a:lvl5pPr>
+            <a:lvl6pPr eaLnBrk="1" hangingPunct="1">
+              <a:defRPr>
+                <a:solidFill>
+                  <a:schemeClr val="tx2"/>
+                </a:solidFill>
+              </a:defRPr>
+            </a:lvl6pPr>
+            <a:lvl7pPr eaLnBrk="1" hangingPunct="1">
+              <a:defRPr>
+                <a:solidFill>
+                  <a:schemeClr val="tx2"/>
+                </a:solidFill>
+              </a:defRPr>
+            </a:lvl7pPr>
+            <a:lvl8pPr eaLnBrk="1" hangingPunct="1">
+              <a:defRPr>
+                <a:solidFill>
+                  <a:schemeClr val="tx2"/>
+                </a:solidFill>
+              </a:defRPr>
+            </a:lvl8pPr>
+            <a:lvl9pPr eaLnBrk="1" hangingPunct="1">
+              <a:defRPr>
+                <a:solidFill>
+                  <a:schemeClr val="tx2"/>
+                </a:solidFill>
+              </a:defRPr>
+            </a:lvl9pPr>
+          </a:lstStyle>
+          <a:p>
+            <a:pPr algn="ctr"/>
+            <a:r>
+              <a:rPr lang="hu-HU" sz="3200" dirty="0" err="1"/>
+              <a:t>Trello</a:t>
+            </a:r>
+            <a:endParaRPr lang="hu-HU" dirty="0"/>
+          </a:p>
+        </p:txBody>
+      </p:sp>
+      <p:pic>
+        <p:nvPicPr>
+          <p:cNvPr id="3" name="Kép 2" descr="A képen szöveg, képernyőkép, Betűtípus látható&#10;&#10;Előfordulhat, hogy az AI által létrehozott tartalom helytelen.">
+            <a:extLst>
+              <a:ext uri="{FF2B5EF4-FFF2-40B4-BE49-F238E27FC236}">
+                <a16:creationId xmlns:a16="http://schemas.microsoft.com/office/drawing/2014/main" id="{AEB132B2-6CD0-0862-02C4-43AFE90AA23A}"/>
+              </a:ext>
+            </a:extLst>
+          </p:cNvPr>
+          <p:cNvPicPr>
+            <a:picLocks noChangeAspect="1"/>
+          </p:cNvPicPr>
+          <p:nvPr/>
+        </p:nvPicPr>
+        <p:blipFill>
+          <a:blip r:embed="rId3"/>
+          <a:stretch>
+            <a:fillRect/>
+          </a:stretch>
+        </p:blipFill>
+        <p:spPr>
+          <a:xfrm>
+            <a:off x="429557" y="706367"/>
+            <a:ext cx="5433531" cy="5982218"/>
+          </a:xfrm>
+          <a:prstGeom prst="rect">
+            <a:avLst/>
+          </a:prstGeom>
+        </p:spPr>
+      </p:pic>
+      <p:pic>
+        <p:nvPicPr>
+          <p:cNvPr id="6" name="Kép 5" descr="A képen szöveg, képernyőkép, Betűtípus látható&#10;&#10;Előfordulhat, hogy az AI által létrehozott tartalom helytelen.">
+            <a:extLst>
+              <a:ext uri="{FF2B5EF4-FFF2-40B4-BE49-F238E27FC236}">
+                <a16:creationId xmlns:a16="http://schemas.microsoft.com/office/drawing/2014/main" id="{F35BC30D-1F83-4619-9957-57610E814295}"/>
+              </a:ext>
+            </a:extLst>
+          </p:cNvPr>
+          <p:cNvPicPr>
+            <a:picLocks noChangeAspect="1"/>
+          </p:cNvPicPr>
+          <p:nvPr/>
+        </p:nvPicPr>
+        <p:blipFill>
+          <a:blip r:embed="rId4"/>
+          <a:stretch>
+            <a:fillRect/>
+          </a:stretch>
+        </p:blipFill>
+        <p:spPr>
+          <a:xfrm>
+            <a:off x="6095999" y="706367"/>
+            <a:ext cx="5433531" cy="5982218"/>
+          </a:xfrm>
+          <a:prstGeom prst="rect">
+            <a:avLst/>
+          </a:prstGeom>
+        </p:spPr>
+      </p:pic>
+    </p:spTree>
+    <p:extLst>
+      <p:ext uri="{BB962C8B-B14F-4D97-AF65-F5344CB8AC3E}">
+        <p14:creationId xmlns:p14="http://schemas.microsoft.com/office/powerpoint/2010/main" val="2220433323"/>
+      </p:ext>
+    </p:extLst>
+  </p:cSld>
+  <p:clrMapOvr>
+    <a:masterClrMapping/>
+  </p:clrMapOvr>
+</p:sld>
+</file>
+
+<file path=ppt/slides/slide4.xml><?xml version="1.0" encoding="utf-8"?>
+<p:sld xmlns:a="http://schemas.openxmlformats.org/drawingml/2006/main" xmlns:r="http://schemas.openxmlformats.org/officeDocument/2006/relationships" xmlns:p="http://schemas.openxmlformats.org/presentationml/2006/main">
+  <p:cSld>
+    <p:spTree>
+      <p:nvGrpSpPr>
+        <p:cNvPr id="1" name="">
+          <a:extLst>
+            <a:ext uri="{FF2B5EF4-FFF2-40B4-BE49-F238E27FC236}">
+              <a16:creationId xmlns:a16="http://schemas.microsoft.com/office/drawing/2014/main" id="{0E789C0D-92C2-535F-E395-872F6A3F5759}"/>
+            </a:ext>
+          </a:extLst>
+        </p:cNvPr>
+        <p:cNvGrpSpPr/>
+        <p:nvPr/>
+      </p:nvGrpSpPr>
+      <p:grpSpPr>
+        <a:xfrm>
+          <a:off x="0" y="0"/>
+          <a:ext cx="0" cy="0"/>
+          <a:chOff x="0" y="0"/>
+          <a:chExt cx="0" cy="0"/>
+        </a:xfrm>
+      </p:grpSpPr>
+      <p:sp>
+        <p:nvSpPr>
+          <p:cNvPr id="12" name="Cím 1">
+            <a:extLst>
+              <a:ext uri="{FF2B5EF4-FFF2-40B4-BE49-F238E27FC236}">
+                <a16:creationId xmlns:a16="http://schemas.microsoft.com/office/drawing/2014/main" id="{45A7FD28-86E1-64A6-79DF-8EBCA6FEB951}"/>
+              </a:ext>
+            </a:extLst>
+          </p:cNvPr>
+          <p:cNvSpPr txBox="1">
+            <a:spLocks/>
+          </p:cNvSpPr>
+          <p:nvPr/>
+        </p:nvSpPr>
+        <p:spPr>
+          <a:xfrm>
+            <a:off x="1776524" y="83662"/>
+            <a:ext cx="8638951" cy="514550"/>
+          </a:xfrm>
+          <a:prstGeom prst="rect">
+            <a:avLst/>
+          </a:prstGeom>
+        </p:spPr>
+        <p:txBody>
+          <a:bodyPr vert="horz" lIns="91440" tIns="45720" rIns="91440" bIns="45720" rtlCol="0" anchor="t">
+            <a:noAutofit/>
+          </a:bodyPr>
+          <a:lstStyle>
+            <a:lvl1pPr algn="l" defTabSz="457200" rtl="0" eaLnBrk="1" latinLnBrk="0" hangingPunct="1">
+              <a:spcBef>
+                <a:spcPct val="0"/>
+              </a:spcBef>
+              <a:buNone/>
+              <a:defRPr sz="4200" b="0" i="0" kern="1200">
+                <a:solidFill>
+                  <a:schemeClr val="tx2"/>
+                </a:solidFill>
+                <a:latin typeface="+mj-lt"/>
+                <a:ea typeface="+mj-ea"/>
+                <a:cs typeface="+mj-cs"/>
+              </a:defRPr>
+            </a:lvl1pPr>
+            <a:lvl2pPr eaLnBrk="1" hangingPunct="1">
+              <a:defRPr>
+                <a:solidFill>
+                  <a:schemeClr val="tx2"/>
+                </a:solidFill>
+              </a:defRPr>
+            </a:lvl2pPr>
+            <a:lvl3pPr eaLnBrk="1" hangingPunct="1">
+              <a:defRPr>
+                <a:solidFill>
+                  <a:schemeClr val="tx2"/>
+                </a:solidFill>
+              </a:defRPr>
+            </a:lvl3pPr>
+            <a:lvl4pPr eaLnBrk="1" hangingPunct="1">
+              <a:defRPr>
+                <a:solidFill>
+                  <a:schemeClr val="tx2"/>
+                </a:solidFill>
+              </a:defRPr>
+            </a:lvl4pPr>
+            <a:lvl5pPr eaLnBrk="1" hangingPunct="1">
+              <a:defRPr>
+                <a:solidFill>
+                  <a:schemeClr val="tx2"/>
+                </a:solidFill>
+              </a:defRPr>
+            </a:lvl5pPr>
+            <a:lvl6pPr eaLnBrk="1" hangingPunct="1">
+              <a:defRPr>
+                <a:solidFill>
+                  <a:schemeClr val="tx2"/>
+                </a:solidFill>
+              </a:defRPr>
+            </a:lvl6pPr>
+            <a:lvl7pPr eaLnBrk="1" hangingPunct="1">
+              <a:defRPr>
+                <a:solidFill>
+                  <a:schemeClr val="tx2"/>
+                </a:solidFill>
+              </a:defRPr>
+            </a:lvl7pPr>
+            <a:lvl8pPr eaLnBrk="1" hangingPunct="1">
+              <a:defRPr>
+                <a:solidFill>
+                  <a:schemeClr val="tx2"/>
+                </a:solidFill>
+              </a:defRPr>
+            </a:lvl8pPr>
+            <a:lvl9pPr eaLnBrk="1" hangingPunct="1">
+              <a:defRPr>
+                <a:solidFill>
+                  <a:schemeClr val="tx2"/>
+                </a:solidFill>
+              </a:defRPr>
+            </a:lvl9pPr>
+          </a:lstStyle>
+          <a:p>
+            <a:pPr algn="ctr"/>
+            <a:r>
+              <a:rPr lang="hu-HU" sz="3200" dirty="0" err="1"/>
+              <a:t>Trello</a:t>
+            </a:r>
+            <a:endParaRPr lang="hu-HU" dirty="0"/>
+          </a:p>
+        </p:txBody>
+      </p:sp>
+      <p:pic>
+        <p:nvPicPr>
+          <p:cNvPr id="4" name="Kép 3" descr="A képen szöveg, képernyőkép látható&#10;&#10;Előfordulhat, hogy az AI által létrehozott tartalom helytelen.">
+            <a:extLst>
+              <a:ext uri="{FF2B5EF4-FFF2-40B4-BE49-F238E27FC236}">
+                <a16:creationId xmlns:a16="http://schemas.microsoft.com/office/drawing/2014/main" id="{D296671D-8624-08DC-D25C-2DD7658D7EBA}"/>
+              </a:ext>
+            </a:extLst>
+          </p:cNvPr>
+          <p:cNvPicPr>
+            <a:picLocks noChangeAspect="1"/>
+          </p:cNvPicPr>
+          <p:nvPr/>
+        </p:nvPicPr>
+        <p:blipFill>
+          <a:blip r:embed="rId3"/>
+          <a:stretch>
+            <a:fillRect/>
+          </a:stretch>
+        </p:blipFill>
+        <p:spPr>
+          <a:xfrm>
+            <a:off x="458068" y="706367"/>
+            <a:ext cx="5433531" cy="5982218"/>
+          </a:xfrm>
+          <a:prstGeom prst="rect">
+            <a:avLst/>
+          </a:prstGeom>
+        </p:spPr>
+      </p:pic>
+      <p:pic>
+        <p:nvPicPr>
+          <p:cNvPr id="7" name="Kép 6" descr="A képen szöveg, képernyőkép, Betűtípus látható&#10;&#10;Előfordulhat, hogy az AI által létrehozott tartalom helytelen.">
+            <a:extLst>
+              <a:ext uri="{FF2B5EF4-FFF2-40B4-BE49-F238E27FC236}">
+                <a16:creationId xmlns:a16="http://schemas.microsoft.com/office/drawing/2014/main" id="{741E1021-529D-E654-7870-2DB921D9F572}"/>
+              </a:ext>
+            </a:extLst>
+          </p:cNvPr>
+          <p:cNvPicPr>
+            <a:picLocks noChangeAspect="1"/>
+          </p:cNvPicPr>
+          <p:nvPr/>
+        </p:nvPicPr>
+        <p:blipFill>
+          <a:blip r:embed="rId4"/>
+          <a:stretch>
+            <a:fillRect/>
+          </a:stretch>
+        </p:blipFill>
+        <p:spPr>
+          <a:xfrm>
+            <a:off x="6126481" y="706367"/>
+            <a:ext cx="5433531" cy="5982218"/>
+          </a:xfrm>
+          <a:prstGeom prst="rect">
+            <a:avLst/>
+          </a:prstGeom>
+        </p:spPr>
+      </p:pic>
+    </p:spTree>
+    <p:extLst>
+      <p:ext uri="{BB962C8B-B14F-4D97-AF65-F5344CB8AC3E}">
+        <p14:creationId xmlns:p14="http://schemas.microsoft.com/office/powerpoint/2010/main" val="645229742"/>
+      </p:ext>
+    </p:extLst>
+  </p:cSld>
+  <p:clrMapOvr>
+    <a:masterClrMapping/>
+  </p:clrMapOvr>
+</p:sld>
+</file>
+
+<file path=ppt/slides/slide5.xml><?xml version="1.0" encoding="utf-8"?>
+<p:sld xmlns:a="http://schemas.openxmlformats.org/drawingml/2006/main" xmlns:r="http://schemas.openxmlformats.org/officeDocument/2006/relationships" xmlns:p="http://schemas.openxmlformats.org/presentationml/2006/main">
+  <p:cSld>
+    <p:spTree>
+      <p:nvGrpSpPr>
+        <p:cNvPr id="1" name="">
+          <a:extLst>
+            <a:ext uri="{FF2B5EF4-FFF2-40B4-BE49-F238E27FC236}">
+              <a16:creationId xmlns:a16="http://schemas.microsoft.com/office/drawing/2014/main" id="{CE643D0F-DFAE-825E-D0D9-B03AB05D4B72}"/>
+            </a:ext>
+          </a:extLst>
+        </p:cNvPr>
+        <p:cNvGrpSpPr/>
+        <p:nvPr/>
+      </p:nvGrpSpPr>
+      <p:grpSpPr>
+        <a:xfrm>
+          <a:off x="0" y="0"/>
+          <a:ext cx="0" cy="0"/>
+          <a:chOff x="0" y="0"/>
+          <a:chExt cx="0" cy="0"/>
+        </a:xfrm>
+      </p:grpSpPr>
+      <p:pic>
+        <p:nvPicPr>
+          <p:cNvPr id="3" name="Kép 2" descr="A képen képernyőkép, szoftver, Multimédiás szoftver, szöveg látható&#10;&#10;Előfordulhat, hogy az AI által létrehozott tartalom helytelen.">
+            <a:extLst>
+              <a:ext uri="{FF2B5EF4-FFF2-40B4-BE49-F238E27FC236}">
+                <a16:creationId xmlns:a16="http://schemas.microsoft.com/office/drawing/2014/main" id="{2BFA794B-0A85-6FD4-ECE7-DD6EA5CAF77C}"/>
+              </a:ext>
+            </a:extLst>
+          </p:cNvPr>
+          <p:cNvPicPr>
+            <a:picLocks noChangeAspect="1"/>
+          </p:cNvPicPr>
+          <p:nvPr/>
+        </p:nvPicPr>
+        <p:blipFill>
+          <a:blip r:embed="rId2"/>
+          <a:stretch>
+            <a:fillRect/>
+          </a:stretch>
+        </p:blipFill>
+        <p:spPr>
+          <a:xfrm>
+            <a:off x="397829" y="1327611"/>
+            <a:ext cx="11396340" cy="4202777"/>
+          </a:xfrm>
+          <a:prstGeom prst="rect">
+            <a:avLst/>
+          </a:prstGeom>
+        </p:spPr>
+      </p:pic>
+      <p:sp>
+        <p:nvSpPr>
+          <p:cNvPr id="4" name="Cím 1">
+            <a:extLst>
+              <a:ext uri="{FF2B5EF4-FFF2-40B4-BE49-F238E27FC236}">
+                <a16:creationId xmlns:a16="http://schemas.microsoft.com/office/drawing/2014/main" id="{C08AAE63-C0A9-7540-D2E6-E6465FA93A18}"/>
+              </a:ext>
+            </a:extLst>
+          </p:cNvPr>
+          <p:cNvSpPr txBox="1">
+            <a:spLocks/>
+          </p:cNvSpPr>
+          <p:nvPr/>
+        </p:nvSpPr>
+        <p:spPr>
+          <a:xfrm>
+            <a:off x="1776524" y="486785"/>
+            <a:ext cx="8638951" cy="514550"/>
+          </a:xfrm>
+          <a:prstGeom prst="rect">
+            <a:avLst/>
+          </a:prstGeom>
+        </p:spPr>
+        <p:txBody>
+          <a:bodyPr vert="horz" lIns="91440" tIns="45720" rIns="91440" bIns="45720" rtlCol="0" anchor="t">
+            <a:noAutofit/>
+          </a:bodyPr>
+          <a:lstStyle>
+            <a:lvl1pPr algn="l" defTabSz="457200" rtl="0" eaLnBrk="1" latinLnBrk="0" hangingPunct="1">
+              <a:spcBef>
+                <a:spcPct val="0"/>
+              </a:spcBef>
+              <a:buNone/>
+              <a:defRPr sz="4200" b="0" i="0" kern="1200">
+                <a:solidFill>
+                  <a:schemeClr val="tx2"/>
+                </a:solidFill>
+                <a:latin typeface="+mj-lt"/>
+                <a:ea typeface="+mj-ea"/>
+                <a:cs typeface="+mj-cs"/>
+              </a:defRPr>
+            </a:lvl1pPr>
+            <a:lvl2pPr eaLnBrk="1" hangingPunct="1">
+              <a:defRPr>
+                <a:solidFill>
+                  <a:schemeClr val="tx2"/>
+                </a:solidFill>
+              </a:defRPr>
+            </a:lvl2pPr>
+            <a:lvl3pPr eaLnBrk="1" hangingPunct="1">
+              <a:defRPr>
+                <a:solidFill>
+                  <a:schemeClr val="tx2"/>
+                </a:solidFill>
+              </a:defRPr>
+            </a:lvl3pPr>
+            <a:lvl4pPr eaLnBrk="1" hangingPunct="1">
+              <a:defRPr>
+                <a:solidFill>
+                  <a:schemeClr val="tx2"/>
+                </a:solidFill>
+              </a:defRPr>
+            </a:lvl4pPr>
+            <a:lvl5pPr eaLnBrk="1" hangingPunct="1">
+              <a:defRPr>
+                <a:solidFill>
+                  <a:schemeClr val="tx2"/>
+                </a:solidFill>
+              </a:defRPr>
+            </a:lvl5pPr>
+            <a:lvl6pPr eaLnBrk="1" hangingPunct="1">
+              <a:defRPr>
+                <a:solidFill>
+                  <a:schemeClr val="tx2"/>
+                </a:solidFill>
+              </a:defRPr>
+            </a:lvl6pPr>
+            <a:lvl7pPr eaLnBrk="1" hangingPunct="1">
+              <a:defRPr>
+                <a:solidFill>
+                  <a:schemeClr val="tx2"/>
+                </a:solidFill>
+              </a:defRPr>
+            </a:lvl7pPr>
+            <a:lvl8pPr eaLnBrk="1" hangingPunct="1">
+              <a:defRPr>
+                <a:solidFill>
+                  <a:schemeClr val="tx2"/>
+                </a:solidFill>
+              </a:defRPr>
+            </a:lvl8pPr>
+            <a:lvl9pPr eaLnBrk="1" hangingPunct="1">
+              <a:defRPr>
+                <a:solidFill>
+                  <a:schemeClr val="tx2"/>
+                </a:solidFill>
+              </a:defRPr>
+            </a:lvl9pPr>
+          </a:lstStyle>
+          <a:p>
+            <a:pPr algn="ctr"/>
+            <a:r>
+              <a:rPr lang="hu-HU" sz="3200" dirty="0"/>
+              <a:t>Backend struktúra</a:t>
+            </a:r>
+            <a:endParaRPr lang="hu-HU" dirty="0"/>
+          </a:p>
+        </p:txBody>
+      </p:sp>
+    </p:spTree>
+    <p:extLst>
+      <p:ext uri="{BB962C8B-B14F-4D97-AF65-F5344CB8AC3E}">
+        <p14:creationId xmlns:p14="http://schemas.microsoft.com/office/powerpoint/2010/main" val="3469819949"/>
+      </p:ext>
+    </p:extLst>
+  </p:cSld>
+  <p:clrMapOvr>
+    <a:masterClrMapping/>
+  </p:clrMapOvr>
+</p:sld>
+</file>
+
+<file path=ppt/slides/slide6.xml><?xml version="1.0" encoding="utf-8"?>
+<p:sld xmlns:a="http://schemas.openxmlformats.org/drawingml/2006/main" xmlns:r="http://schemas.openxmlformats.org/officeDocument/2006/relationships" xmlns:p="http://schemas.openxmlformats.org/presentationml/2006/main">
+  <p:cSld>
+    <p:spTree>
+      <p:nvGrpSpPr>
+        <p:cNvPr id="1" name="">
+          <a:extLst>
+            <a:ext uri="{FF2B5EF4-FFF2-40B4-BE49-F238E27FC236}">
+              <a16:creationId xmlns:a16="http://schemas.microsoft.com/office/drawing/2014/main" id="{E398A118-CDAF-3938-F1BC-39220A30AC3C}"/>
+            </a:ext>
+          </a:extLst>
+        </p:cNvPr>
+        <p:cNvGrpSpPr/>
+        <p:nvPr/>
+      </p:nvGrpSpPr>
+      <p:grpSpPr>
+        <a:xfrm>
+          <a:off x="0" y="0"/>
+          <a:ext cx="0" cy="0"/>
+          <a:chOff x="0" y="0"/>
+          <a:chExt cx="0" cy="0"/>
+        </a:xfrm>
+      </p:grpSpPr>
+      <p:sp>
+        <p:nvSpPr>
+          <p:cNvPr id="4" name="Cím 1">
+            <a:extLst>
+              <a:ext uri="{FF2B5EF4-FFF2-40B4-BE49-F238E27FC236}">
+                <a16:creationId xmlns:a16="http://schemas.microsoft.com/office/drawing/2014/main" id="{16CD97CE-2EC7-FBDC-E192-37D4F5B297DE}"/>
+              </a:ext>
+            </a:extLst>
+          </p:cNvPr>
+          <p:cNvSpPr txBox="1">
+            <a:spLocks/>
+          </p:cNvSpPr>
+          <p:nvPr/>
+        </p:nvSpPr>
+        <p:spPr>
+          <a:xfrm>
+            <a:off x="1776524" y="486785"/>
+            <a:ext cx="8638951" cy="514550"/>
+          </a:xfrm>
+          <a:prstGeom prst="rect">
+            <a:avLst/>
+          </a:prstGeom>
+        </p:spPr>
+        <p:txBody>
+          <a:bodyPr vert="horz" lIns="91440" tIns="45720" rIns="91440" bIns="45720" rtlCol="0" anchor="t">
+            <a:noAutofit/>
+          </a:bodyPr>
+          <a:lstStyle>
+            <a:lvl1pPr algn="l" defTabSz="457200" rtl="0" eaLnBrk="1" latinLnBrk="0" hangingPunct="1">
+              <a:spcBef>
+                <a:spcPct val="0"/>
+              </a:spcBef>
+              <a:buNone/>
+              <a:defRPr sz="4200" b="0" i="0" kern="1200">
+                <a:solidFill>
+                  <a:schemeClr val="tx2"/>
+                </a:solidFill>
+                <a:latin typeface="+mj-lt"/>
+                <a:ea typeface="+mj-ea"/>
+                <a:cs typeface="+mj-cs"/>
+              </a:defRPr>
+            </a:lvl1pPr>
+            <a:lvl2pPr eaLnBrk="1" hangingPunct="1">
+              <a:defRPr>
+                <a:solidFill>
+                  <a:schemeClr val="tx2"/>
+                </a:solidFill>
+              </a:defRPr>
+            </a:lvl2pPr>
+            <a:lvl3pPr eaLnBrk="1" hangingPunct="1">
+              <a:defRPr>
+                <a:solidFill>
+                  <a:schemeClr val="tx2"/>
+                </a:solidFill>
+              </a:defRPr>
+            </a:lvl3pPr>
+            <a:lvl4pPr eaLnBrk="1" hangingPunct="1">
+              <a:defRPr>
+                <a:solidFill>
+                  <a:schemeClr val="tx2"/>
+                </a:solidFill>
+              </a:defRPr>
+            </a:lvl4pPr>
+            <a:lvl5pPr eaLnBrk="1" hangingPunct="1">
+              <a:defRPr>
+                <a:solidFill>
+                  <a:schemeClr val="tx2"/>
+                </a:solidFill>
+              </a:defRPr>
+            </a:lvl5pPr>
+            <a:lvl6pPr eaLnBrk="1" hangingPunct="1">
+              <a:defRPr>
+                <a:solidFill>
+                  <a:schemeClr val="tx2"/>
+                </a:solidFill>
+              </a:defRPr>
+            </a:lvl6pPr>
+            <a:lvl7pPr eaLnBrk="1" hangingPunct="1">
+              <a:defRPr>
+                <a:solidFill>
+                  <a:schemeClr val="tx2"/>
+                </a:solidFill>
+              </a:defRPr>
+            </a:lvl7pPr>
+            <a:lvl8pPr eaLnBrk="1" hangingPunct="1">
+              <a:defRPr>
+                <a:solidFill>
+                  <a:schemeClr val="tx2"/>
+                </a:solidFill>
+              </a:defRPr>
+            </a:lvl8pPr>
+            <a:lvl9pPr eaLnBrk="1" hangingPunct="1">
+              <a:defRPr>
+                <a:solidFill>
+                  <a:schemeClr val="tx2"/>
+                </a:solidFill>
+              </a:defRPr>
+            </a:lvl9pPr>
+          </a:lstStyle>
+          <a:p>
+            <a:pPr algn="ctr"/>
+            <a:r>
+              <a:rPr lang="hu-HU" sz="3200" dirty="0"/>
+              <a:t>Frontend struktúra</a:t>
+            </a:r>
+            <a:endParaRPr lang="hu-HU" dirty="0"/>
+          </a:p>
+        </p:txBody>
+      </p:sp>
+      <p:pic>
+        <p:nvPicPr>
+          <p:cNvPr id="5" name="Kép 4" descr="A képen képernyőkép, szöveg, szoftver, Multimédiás szoftver látható&#10;&#10;Előfordulhat, hogy az AI által létrehozott tartalom helytelen.">
+            <a:extLst>
+              <a:ext uri="{FF2B5EF4-FFF2-40B4-BE49-F238E27FC236}">
+                <a16:creationId xmlns:a16="http://schemas.microsoft.com/office/drawing/2014/main" id="{2AC16A66-ACAB-955E-C6BE-7478E2E6CC92}"/>
+              </a:ext>
+            </a:extLst>
+          </p:cNvPr>
+          <p:cNvPicPr>
+            <a:picLocks noChangeAspect="1"/>
+          </p:cNvPicPr>
+          <p:nvPr/>
+        </p:nvPicPr>
+        <p:blipFill>
+          <a:blip r:embed="rId2"/>
+          <a:stretch>
+            <a:fillRect/>
+          </a:stretch>
+        </p:blipFill>
+        <p:spPr>
+          <a:xfrm>
+            <a:off x="541474" y="1388144"/>
+            <a:ext cx="11109052" cy="4081712"/>
+          </a:xfrm>
+          <a:prstGeom prst="rect">
+            <a:avLst/>
+          </a:prstGeom>
+        </p:spPr>
+      </p:pic>
+    </p:spTree>
+    <p:extLst>
+      <p:ext uri="{BB962C8B-B14F-4D97-AF65-F5344CB8AC3E}">
+        <p14:creationId xmlns:p14="http://schemas.microsoft.com/office/powerpoint/2010/main" val="187490371"/>
+      </p:ext>
+    </p:extLst>
+  </p:cSld>
+  <p:clrMapOvr>
+    <a:masterClrMapping/>
+  </p:clrMapOvr>
+</p:sld>
+</file>
+
+<file path=ppt/slides/slide7.xml><?xml version="1.0" encoding="utf-8"?>
 <p:sld xmlns:a="http://schemas.openxmlformats.org/drawingml/2006/main" xmlns:r="http://schemas.openxmlformats.org/officeDocument/2006/relationships" xmlns:p="http://schemas.openxmlformats.org/presentationml/2006/main">
   <p:cSld>
     <p:spTree>
@@ -7371,7 +9068,7 @@
 </p:sld>
 </file>
 
-<file path=ppt/slides/slide3.xml><?xml version="1.0" encoding="utf-8"?>
+<file path=ppt/slides/slide8.xml><?xml version="1.0" encoding="utf-8"?>
 <p:sld xmlns:a="http://schemas.openxmlformats.org/drawingml/2006/main" xmlns:r="http://schemas.openxmlformats.org/officeDocument/2006/relationships" xmlns:p="http://schemas.openxmlformats.org/presentationml/2006/main">
   <p:cSld>
     <p:spTree>
@@ -7443,7 +9140,7 @@
 </p:sld>
 </file>
 
-<file path=ppt/slides/slide4.xml><?xml version="1.0" encoding="utf-8"?>
+<file path=ppt/slides/slide9.xml><?xml version="1.0" encoding="utf-8"?>
 <p:sld xmlns:a="http://schemas.openxmlformats.org/drawingml/2006/main" xmlns:r="http://schemas.openxmlformats.org/officeDocument/2006/relationships" xmlns:p="http://schemas.openxmlformats.org/presentationml/2006/main">
   <p:cSld>
     <p:spTree>
@@ -7468,10 +9165,10 @@
       </p:grpSpPr>
       <p:pic>
         <p:nvPicPr>
-          <p:cNvPr id="6" name="Kép 5" descr="A képen szöveg, képernyőkép látható&#10;&#10;Előfordulhat, hogy az AI által létrehozott tartalom helytelen.">
+          <p:cNvPr id="5" name="Kép 4" descr="A képen szöveg, képernyőkép, Betűtípus látható&#10;&#10;Előfordulhat, hogy az AI által létrehozott tartalom helytelen.">
             <a:extLst>
               <a:ext uri="{FF2B5EF4-FFF2-40B4-BE49-F238E27FC236}">
-                <a16:creationId xmlns:a16="http://schemas.microsoft.com/office/drawing/2014/main" id="{217F1494-239C-3764-A12C-0943BEECD861}"/>
+                <a16:creationId xmlns:a16="http://schemas.microsoft.com/office/drawing/2014/main" id="{4DA9F719-83BC-5C60-93C6-918764A35E05}"/>
               </a:ext>
             </a:extLst>
           </p:cNvPr>
@@ -7481,21 +9178,15 @@
           <p:nvPr/>
         </p:nvPicPr>
         <p:blipFill>
-          <a:blip r:embed="rId2">
-            <a:extLst>
-              <a:ext uri="{28A0092B-C50C-407E-A947-70E740481C1C}">
-                <a14:useLocalDpi xmlns:a14="http://schemas.microsoft.com/office/drawing/2010/main" val="0"/>
-              </a:ext>
-            </a:extLst>
-          </a:blip>
+          <a:blip r:embed="rId2"/>
           <a:stretch>
             <a:fillRect/>
           </a:stretch>
         </p:blipFill>
         <p:spPr>
           <a:xfrm>
-            <a:off x="2321973" y="777086"/>
-            <a:ext cx="7548054" cy="5303828"/>
+            <a:off x="2562803" y="1019262"/>
+            <a:ext cx="7066394" cy="4819476"/>
           </a:xfrm>
           <a:prstGeom prst="rect">
             <a:avLst/>
@@ -7506,366 +9197,6 @@
     <p:extLst>
       <p:ext uri="{BB962C8B-B14F-4D97-AF65-F5344CB8AC3E}">
         <p14:creationId xmlns:p14="http://schemas.microsoft.com/office/powerpoint/2010/main" val="2161619848"/>
-      </p:ext>
-    </p:extLst>
-  </p:cSld>
-  <p:clrMapOvr>
-    <a:masterClrMapping/>
-  </p:clrMapOvr>
-</p:sld>
-</file>
-
-<file path=ppt/slides/slide5.xml><?xml version="1.0" encoding="utf-8"?>
-<p:sld xmlns:a="http://schemas.openxmlformats.org/drawingml/2006/main" xmlns:r="http://schemas.openxmlformats.org/officeDocument/2006/relationships" xmlns:p="http://schemas.openxmlformats.org/presentationml/2006/main">
-  <p:cSld>
-    <p:spTree>
-      <p:nvGrpSpPr>
-        <p:cNvPr id="1" name="">
-          <a:extLst>
-            <a:ext uri="{FF2B5EF4-FFF2-40B4-BE49-F238E27FC236}">
-              <a16:creationId xmlns:a16="http://schemas.microsoft.com/office/drawing/2014/main" id="{0B0F1546-899D-A56E-6B5E-4FB46E7DBF5C}"/>
-            </a:ext>
-          </a:extLst>
-        </p:cNvPr>
-        <p:cNvGrpSpPr/>
-        <p:nvPr/>
-      </p:nvGrpSpPr>
-      <p:grpSpPr>
-        <a:xfrm>
-          <a:off x="0" y="0"/>
-          <a:ext cx="0" cy="0"/>
-          <a:chOff x="0" y="0"/>
-          <a:chExt cx="0" cy="0"/>
-        </a:xfrm>
-      </p:grpSpPr>
-      <p:pic>
-        <p:nvPicPr>
-          <p:cNvPr id="3" name="Kép 2" descr="A képen szöveg, képernyőkép látható&#10;&#10;Előfordulhat, hogy az AI által létrehozott tartalom helytelen.">
-            <a:extLst>
-              <a:ext uri="{FF2B5EF4-FFF2-40B4-BE49-F238E27FC236}">
-                <a16:creationId xmlns:a16="http://schemas.microsoft.com/office/drawing/2014/main" id="{91B9883D-C1BF-18EA-C7C9-072766D67C82}"/>
-              </a:ext>
-            </a:extLst>
-          </p:cNvPr>
-          <p:cNvPicPr>
-            <a:picLocks noChangeAspect="1"/>
-          </p:cNvPicPr>
-          <p:nvPr/>
-        </p:nvPicPr>
-        <p:blipFill>
-          <a:blip r:embed="rId2">
-            <a:extLst>
-              <a:ext uri="{28A0092B-C50C-407E-A947-70E740481C1C}">
-                <a14:useLocalDpi xmlns:a14="http://schemas.microsoft.com/office/drawing/2010/main" val="0"/>
-              </a:ext>
-            </a:extLst>
-          </a:blip>
-          <a:stretch>
-            <a:fillRect/>
-          </a:stretch>
-        </p:blipFill>
-        <p:spPr>
-          <a:xfrm>
-            <a:off x="1866533" y="399787"/>
-            <a:ext cx="8458933" cy="6058425"/>
-          </a:xfrm>
-          <a:prstGeom prst="rect">
-            <a:avLst/>
-          </a:prstGeom>
-        </p:spPr>
-      </p:pic>
-    </p:spTree>
-    <p:extLst>
-      <p:ext uri="{BB962C8B-B14F-4D97-AF65-F5344CB8AC3E}">
-        <p14:creationId xmlns:p14="http://schemas.microsoft.com/office/powerpoint/2010/main" val="2004753628"/>
-      </p:ext>
-    </p:extLst>
-  </p:cSld>
-  <p:clrMapOvr>
-    <a:masterClrMapping/>
-  </p:clrMapOvr>
-</p:sld>
-</file>
-
-<file path=ppt/slides/slide6.xml><?xml version="1.0" encoding="utf-8"?>
-<p:sld xmlns:a="http://schemas.openxmlformats.org/drawingml/2006/main" xmlns:r="http://schemas.openxmlformats.org/officeDocument/2006/relationships" xmlns:p="http://schemas.openxmlformats.org/presentationml/2006/main">
-  <p:cSld>
-    <p:spTree>
-      <p:nvGrpSpPr>
-        <p:cNvPr id="1" name="">
-          <a:extLst>
-            <a:ext uri="{FF2B5EF4-FFF2-40B4-BE49-F238E27FC236}">
-              <a16:creationId xmlns:a16="http://schemas.microsoft.com/office/drawing/2014/main" id="{3324A8F7-CB10-0929-2075-7402F5C6E2E4}"/>
-            </a:ext>
-          </a:extLst>
-        </p:cNvPr>
-        <p:cNvGrpSpPr/>
-        <p:nvPr/>
-      </p:nvGrpSpPr>
-      <p:grpSpPr>
-        <a:xfrm>
-          <a:off x="0" y="0"/>
-          <a:ext cx="0" cy="0"/>
-          <a:chOff x="0" y="0"/>
-          <a:chExt cx="0" cy="0"/>
-        </a:xfrm>
-      </p:grpSpPr>
-      <p:pic>
-        <p:nvPicPr>
-          <p:cNvPr id="4" name="Kép 3" descr="A képen képernyőkép, lila látható&#10;&#10;Előfordulhat, hogy az AI által létrehozott tartalom helytelen.">
-            <a:extLst>
-              <a:ext uri="{FF2B5EF4-FFF2-40B4-BE49-F238E27FC236}">
-                <a16:creationId xmlns:a16="http://schemas.microsoft.com/office/drawing/2014/main" id="{26630B3E-7905-3A81-90C7-BC31551585D5}"/>
-              </a:ext>
-            </a:extLst>
-          </p:cNvPr>
-          <p:cNvPicPr>
-            <a:picLocks noChangeAspect="1"/>
-          </p:cNvPicPr>
-          <p:nvPr/>
-        </p:nvPicPr>
-        <p:blipFill>
-          <a:blip r:embed="rId3">
-            <a:extLst>
-              <a:ext uri="{28A0092B-C50C-407E-A947-70E740481C1C}">
-                <a14:useLocalDpi xmlns:a14="http://schemas.microsoft.com/office/drawing/2010/main" val="0"/>
-              </a:ext>
-            </a:extLst>
-          </a:blip>
-          <a:stretch>
-            <a:fillRect/>
-          </a:stretch>
-        </p:blipFill>
-        <p:spPr>
-          <a:xfrm>
-            <a:off x="1963989" y="1098214"/>
-            <a:ext cx="8264022" cy="4661571"/>
-          </a:xfrm>
-          <a:prstGeom prst="rect">
-            <a:avLst/>
-          </a:prstGeom>
-        </p:spPr>
-      </p:pic>
-    </p:spTree>
-    <p:extLst>
-      <p:ext uri="{BB962C8B-B14F-4D97-AF65-F5344CB8AC3E}">
-        <p14:creationId xmlns:p14="http://schemas.microsoft.com/office/powerpoint/2010/main" val="3411416098"/>
-      </p:ext>
-    </p:extLst>
-  </p:cSld>
-  <p:clrMapOvr>
-    <a:masterClrMapping/>
-  </p:clrMapOvr>
-</p:sld>
-</file>
-
-<file path=ppt/slides/slide7.xml><?xml version="1.0" encoding="utf-8"?>
-<p:sld xmlns:a="http://schemas.openxmlformats.org/drawingml/2006/main" xmlns:r="http://schemas.openxmlformats.org/officeDocument/2006/relationships" xmlns:p="http://schemas.openxmlformats.org/presentationml/2006/main">
-  <p:cSld>
-    <p:spTree>
-      <p:nvGrpSpPr>
-        <p:cNvPr id="1" name="">
-          <a:extLst>
-            <a:ext uri="{FF2B5EF4-FFF2-40B4-BE49-F238E27FC236}">
-              <a16:creationId xmlns:a16="http://schemas.microsoft.com/office/drawing/2014/main" id="{87004B1A-1514-77B2-13D8-2A831FEEFEAB}"/>
-            </a:ext>
-          </a:extLst>
-        </p:cNvPr>
-        <p:cNvGrpSpPr/>
-        <p:nvPr/>
-      </p:nvGrpSpPr>
-      <p:grpSpPr>
-        <a:xfrm>
-          <a:off x="0" y="0"/>
-          <a:ext cx="0" cy="0"/>
-          <a:chOff x="0" y="0"/>
-          <a:chExt cx="0" cy="0"/>
-        </a:xfrm>
-      </p:grpSpPr>
-      <p:pic>
-        <p:nvPicPr>
-          <p:cNvPr id="8" name="Kép 7" descr="A képen szöveg, képernyőkép, szoftver, képernyő látható&#10;&#10;Előfordulhat, hogy az AI által létrehozott tartalom helytelen.">
-            <a:extLst>
-              <a:ext uri="{FF2B5EF4-FFF2-40B4-BE49-F238E27FC236}">
-                <a16:creationId xmlns:a16="http://schemas.microsoft.com/office/drawing/2014/main" id="{DF8662D7-2118-A6BC-24CD-8CCC9600DE7E}"/>
-              </a:ext>
-            </a:extLst>
-          </p:cNvPr>
-          <p:cNvPicPr>
-            <a:picLocks noChangeAspect="1"/>
-          </p:cNvPicPr>
-          <p:nvPr/>
-        </p:nvPicPr>
-        <p:blipFill>
-          <a:blip r:embed="rId3">
-            <a:extLst>
-              <a:ext uri="{28A0092B-C50C-407E-A947-70E740481C1C}">
-                <a14:useLocalDpi xmlns:a14="http://schemas.microsoft.com/office/drawing/2010/main" val="0"/>
-              </a:ext>
-            </a:extLst>
-          </a:blip>
-          <a:stretch>
-            <a:fillRect/>
-          </a:stretch>
-        </p:blipFill>
-        <p:spPr>
-          <a:xfrm>
-            <a:off x="2228887" y="844815"/>
-            <a:ext cx="7734226" cy="5168369"/>
-          </a:xfrm>
-          <a:prstGeom prst="rect">
-            <a:avLst/>
-          </a:prstGeom>
-        </p:spPr>
-      </p:pic>
-    </p:spTree>
-    <p:extLst>
-      <p:ext uri="{BB962C8B-B14F-4D97-AF65-F5344CB8AC3E}">
-        <p14:creationId xmlns:p14="http://schemas.microsoft.com/office/powerpoint/2010/main" val="2274802669"/>
-      </p:ext>
-    </p:extLst>
-  </p:cSld>
-  <p:clrMapOvr>
-    <a:masterClrMapping/>
-  </p:clrMapOvr>
-</p:sld>
-</file>
-
-<file path=ppt/slides/slide8.xml><?xml version="1.0" encoding="utf-8"?>
-<p:sld xmlns:a="http://schemas.openxmlformats.org/drawingml/2006/main" xmlns:r="http://schemas.openxmlformats.org/officeDocument/2006/relationships" xmlns:p="http://schemas.openxmlformats.org/presentationml/2006/main">
-  <p:cSld>
-    <p:spTree>
-      <p:nvGrpSpPr>
-        <p:cNvPr id="1" name="">
-          <a:extLst>
-            <a:ext uri="{FF2B5EF4-FFF2-40B4-BE49-F238E27FC236}">
-              <a16:creationId xmlns:a16="http://schemas.microsoft.com/office/drawing/2014/main" id="{34090B57-E674-E71B-F7F3-1BCAB5102BF8}"/>
-            </a:ext>
-          </a:extLst>
-        </p:cNvPr>
-        <p:cNvGrpSpPr/>
-        <p:nvPr/>
-      </p:nvGrpSpPr>
-      <p:grpSpPr>
-        <a:xfrm>
-          <a:off x="0" y="0"/>
-          <a:ext cx="0" cy="0"/>
-          <a:chOff x="0" y="0"/>
-          <a:chExt cx="0" cy="0"/>
-        </a:xfrm>
-      </p:grpSpPr>
-      <p:pic>
-        <p:nvPicPr>
-          <p:cNvPr id="3" name="Kép 2" descr="A képen szöveg, képernyőkép, szoftver, képernyő látható&#10;&#10;Előfordulhat, hogy az AI által létrehozott tartalom helytelen.">
-            <a:extLst>
-              <a:ext uri="{FF2B5EF4-FFF2-40B4-BE49-F238E27FC236}">
-                <a16:creationId xmlns:a16="http://schemas.microsoft.com/office/drawing/2014/main" id="{D6154DE2-0C93-79C5-0777-3BE43FA4EDC2}"/>
-              </a:ext>
-            </a:extLst>
-          </p:cNvPr>
-          <p:cNvPicPr>
-            <a:picLocks noChangeAspect="1"/>
-          </p:cNvPicPr>
-          <p:nvPr/>
-        </p:nvPicPr>
-        <p:blipFill>
-          <a:blip r:embed="rId3">
-            <a:extLst>
-              <a:ext uri="{28A0092B-C50C-407E-A947-70E740481C1C}">
-                <a14:useLocalDpi xmlns:a14="http://schemas.microsoft.com/office/drawing/2010/main" val="0"/>
-              </a:ext>
-            </a:extLst>
-          </a:blip>
-          <a:stretch>
-            <a:fillRect/>
-          </a:stretch>
-        </p:blipFill>
-        <p:spPr>
-          <a:xfrm>
-            <a:off x="2206038" y="776163"/>
-            <a:ext cx="7779923" cy="5305674"/>
-          </a:xfrm>
-          <a:prstGeom prst="rect">
-            <a:avLst/>
-          </a:prstGeom>
-        </p:spPr>
-      </p:pic>
-    </p:spTree>
-    <p:extLst>
-      <p:ext uri="{BB962C8B-B14F-4D97-AF65-F5344CB8AC3E}">
-        <p14:creationId xmlns:p14="http://schemas.microsoft.com/office/powerpoint/2010/main" val="268667730"/>
-      </p:ext>
-    </p:extLst>
-  </p:cSld>
-  <p:clrMapOvr>
-    <a:masterClrMapping/>
-  </p:clrMapOvr>
-</p:sld>
-</file>
-
-<file path=ppt/slides/slide9.xml><?xml version="1.0" encoding="utf-8"?>
-<p:sld xmlns:a="http://schemas.openxmlformats.org/drawingml/2006/main" xmlns:r="http://schemas.openxmlformats.org/officeDocument/2006/relationships" xmlns:p="http://schemas.openxmlformats.org/presentationml/2006/main">
-  <p:cSld>
-    <p:spTree>
-      <p:nvGrpSpPr>
-        <p:cNvPr id="1" name="">
-          <a:extLst>
-            <a:ext uri="{FF2B5EF4-FFF2-40B4-BE49-F238E27FC236}">
-              <a16:creationId xmlns:a16="http://schemas.microsoft.com/office/drawing/2014/main" id="{0BF6E4E5-21F8-CA9D-0A1D-DE0B78067AF8}"/>
-            </a:ext>
-          </a:extLst>
-        </p:cNvPr>
-        <p:cNvGrpSpPr/>
-        <p:nvPr/>
-      </p:nvGrpSpPr>
-      <p:grpSpPr>
-        <a:xfrm>
-          <a:off x="0" y="0"/>
-          <a:ext cx="0" cy="0"/>
-          <a:chOff x="0" y="0"/>
-          <a:chExt cx="0" cy="0"/>
-        </a:xfrm>
-      </p:grpSpPr>
-      <p:pic>
-        <p:nvPicPr>
-          <p:cNvPr id="6" name="Kép 5" descr="A képen szöveg, képernyőkép, szoftver, Betűtípus látható&#10;&#10;Előfordulhat, hogy az AI által létrehozott tartalom helytelen.">
-            <a:extLst>
-              <a:ext uri="{FF2B5EF4-FFF2-40B4-BE49-F238E27FC236}">
-                <a16:creationId xmlns:a16="http://schemas.microsoft.com/office/drawing/2014/main" id="{6DB1633A-C8C3-A2CA-9184-C726A5007032}"/>
-              </a:ext>
-            </a:extLst>
-          </p:cNvPr>
-          <p:cNvPicPr>
-            <a:picLocks noChangeAspect="1"/>
-          </p:cNvPicPr>
-          <p:nvPr/>
-        </p:nvPicPr>
-        <p:blipFill>
-          <a:blip r:embed="rId3">
-            <a:extLst>
-              <a:ext uri="{28A0092B-C50C-407E-A947-70E740481C1C}">
-                <a14:useLocalDpi xmlns:a14="http://schemas.microsoft.com/office/drawing/2010/main" val="0"/>
-              </a:ext>
-            </a:extLst>
-          </a:blip>
-          <a:stretch>
-            <a:fillRect/>
-          </a:stretch>
-        </p:blipFill>
-        <p:spPr>
-          <a:xfrm>
-            <a:off x="2723858" y="807493"/>
-            <a:ext cx="6744284" cy="5243014"/>
-          </a:xfrm>
-          <a:prstGeom prst="rect">
-            <a:avLst/>
-          </a:prstGeom>
-        </p:spPr>
-      </p:pic>
-    </p:spTree>
-    <p:extLst>
-      <p:ext uri="{BB962C8B-B14F-4D97-AF65-F5344CB8AC3E}">
-        <p14:creationId xmlns:p14="http://schemas.microsoft.com/office/powerpoint/2010/main" val="2527925348"/>
       </p:ext>
     </p:extLst>
   </p:cSld>

</xml_diff>